<commit_message>
Updated mCSD diagram.  Fixes #41.
</commit_message>
<xml_diff>
--- a/input/images-source/mCSD New Diagram attempts.pptx
+++ b/input/images-source/mCSD New Diagram attempts.pptx
@@ -7,7 +7,8 @@
   <p:sldIdLst>
     <p:sldId id="263" r:id="rId2"/>
     <p:sldId id="265" r:id="rId3"/>
-    <p:sldId id="264" r:id="rId4"/>
+    <p:sldId id="266" r:id="rId4"/>
+    <p:sldId id="264" r:id="rId5"/>
   </p:sldIdLst>
   <p:sldSz cx="12192000" cy="6858000"/>
   <p:notesSz cx="6858000" cy="9144000"/>
@@ -106,6 +107,11 @@
       </a:defRPr>
     </a:lvl9pPr>
   </p:defaultTextStyle>
+  <p:extLst>
+    <p:ext uri="{EFAFB233-063F-42B5-8137-9DF3F51BA10A}">
+      <p15:sldGuideLst xmlns:p15="http://schemas.microsoft.com/office/powerpoint/2012/main"/>
+    </p:ext>
+  </p:extLst>
 </p:presentation>
 </file>
 
@@ -256,7 +262,7 @@
           <a:p>
             <a:fld id="{6C23B2A9-562B-4498-A095-68B84EBBCBCB}" type="datetimeFigureOut">
               <a:rPr lang="en-US" smtClean="0"/>
-              <a:t>7/22/2021</a:t>
+              <a:t>4/22/2022</a:t>
             </a:fld>
             <a:endParaRPr lang="en-US"/>
           </a:p>
@@ -454,7 +460,7 @@
           <a:p>
             <a:fld id="{6C23B2A9-562B-4498-A095-68B84EBBCBCB}" type="datetimeFigureOut">
               <a:rPr lang="en-US" smtClean="0"/>
-              <a:t>7/22/2021</a:t>
+              <a:t>4/22/2022</a:t>
             </a:fld>
             <a:endParaRPr lang="en-US"/>
           </a:p>
@@ -662,7 +668,7 @@
           <a:p>
             <a:fld id="{6C23B2A9-562B-4498-A095-68B84EBBCBCB}" type="datetimeFigureOut">
               <a:rPr lang="en-US" smtClean="0"/>
-              <a:t>7/22/2021</a:t>
+              <a:t>4/22/2022</a:t>
             </a:fld>
             <a:endParaRPr lang="en-US"/>
           </a:p>
@@ -860,7 +866,7 @@
           <a:p>
             <a:fld id="{6C23B2A9-562B-4498-A095-68B84EBBCBCB}" type="datetimeFigureOut">
               <a:rPr lang="en-US" smtClean="0"/>
-              <a:t>7/22/2021</a:t>
+              <a:t>4/22/2022</a:t>
             </a:fld>
             <a:endParaRPr lang="en-US"/>
           </a:p>
@@ -1135,7 +1141,7 @@
           <a:p>
             <a:fld id="{6C23B2A9-562B-4498-A095-68B84EBBCBCB}" type="datetimeFigureOut">
               <a:rPr lang="en-US" smtClean="0"/>
-              <a:t>7/22/2021</a:t>
+              <a:t>4/22/2022</a:t>
             </a:fld>
             <a:endParaRPr lang="en-US"/>
           </a:p>
@@ -1400,7 +1406,7 @@
           <a:p>
             <a:fld id="{6C23B2A9-562B-4498-A095-68B84EBBCBCB}" type="datetimeFigureOut">
               <a:rPr lang="en-US" smtClean="0"/>
-              <a:t>7/22/2021</a:t>
+              <a:t>4/22/2022</a:t>
             </a:fld>
             <a:endParaRPr lang="en-US"/>
           </a:p>
@@ -1812,7 +1818,7 @@
           <a:p>
             <a:fld id="{6C23B2A9-562B-4498-A095-68B84EBBCBCB}" type="datetimeFigureOut">
               <a:rPr lang="en-US" smtClean="0"/>
-              <a:t>7/22/2021</a:t>
+              <a:t>4/22/2022</a:t>
             </a:fld>
             <a:endParaRPr lang="en-US"/>
           </a:p>
@@ -1953,7 +1959,7 @@
           <a:p>
             <a:fld id="{6C23B2A9-562B-4498-A095-68B84EBBCBCB}" type="datetimeFigureOut">
               <a:rPr lang="en-US" smtClean="0"/>
-              <a:t>7/22/2021</a:t>
+              <a:t>4/22/2022</a:t>
             </a:fld>
             <a:endParaRPr lang="en-US"/>
           </a:p>
@@ -2066,7 +2072,7 @@
           <a:p>
             <a:fld id="{6C23B2A9-562B-4498-A095-68B84EBBCBCB}" type="datetimeFigureOut">
               <a:rPr lang="en-US" smtClean="0"/>
-              <a:t>7/22/2021</a:t>
+              <a:t>4/22/2022</a:t>
             </a:fld>
             <a:endParaRPr lang="en-US"/>
           </a:p>
@@ -2377,7 +2383,7 @@
           <a:p>
             <a:fld id="{6C23B2A9-562B-4498-A095-68B84EBBCBCB}" type="datetimeFigureOut">
               <a:rPr lang="en-US" smtClean="0"/>
-              <a:t>7/22/2021</a:t>
+              <a:t>4/22/2022</a:t>
             </a:fld>
             <a:endParaRPr lang="en-US"/>
           </a:p>
@@ -2665,7 +2671,7 @@
           <a:p>
             <a:fld id="{6C23B2A9-562B-4498-A095-68B84EBBCBCB}" type="datetimeFigureOut">
               <a:rPr lang="en-US" smtClean="0"/>
-              <a:t>7/22/2021</a:t>
+              <a:t>4/22/2022</a:t>
             </a:fld>
             <a:endParaRPr lang="en-US"/>
           </a:p>
@@ -2906,7 +2912,7 @@
           <a:p>
             <a:fld id="{6C23B2A9-562B-4498-A095-68B84EBBCBCB}" type="datetimeFigureOut">
               <a:rPr lang="en-US" smtClean="0"/>
-              <a:t>7/22/2021</a:t>
+              <a:t>4/22/2022</a:t>
             </a:fld>
             <a:endParaRPr lang="en-US"/>
           </a:p>
@@ -8388,6 +8394,3804 @@
           <a:chExt cx="0" cy="0"/>
         </a:xfrm>
       </p:grpSpPr>
+      <p:grpSp>
+        <p:nvGrpSpPr>
+          <p:cNvPr id="10" name="Group 9"/>
+          <p:cNvGrpSpPr/>
+          <p:nvPr/>
+        </p:nvGrpSpPr>
+        <p:grpSpPr>
+          <a:xfrm>
+            <a:off x="4648989" y="2062778"/>
+            <a:ext cx="1524000" cy="576596"/>
+            <a:chOff x="1219200" y="1219200"/>
+            <a:chExt cx="1524000" cy="957072"/>
+          </a:xfrm>
+        </p:grpSpPr>
+        <p:sp>
+          <p:nvSpPr>
+            <p:cNvPr id="5" name="Flowchart: Card 4"/>
+            <p:cNvSpPr/>
+            <p:nvPr/>
+          </p:nvSpPr>
+          <p:spPr>
+            <a:xfrm>
+              <a:off x="1219200" y="1219200"/>
+              <a:ext cx="1371600" cy="804672"/>
+            </a:xfrm>
+            <a:prstGeom prst="flowChartPunchedCard">
+              <a:avLst/>
+            </a:prstGeom>
+            <a:solidFill>
+              <a:schemeClr val="bg1"/>
+            </a:solidFill>
+            <a:ln>
+              <a:solidFill>
+                <a:schemeClr val="tx1"/>
+              </a:solidFill>
+            </a:ln>
+          </p:spPr>
+          <p:style>
+            <a:lnRef idx="2">
+              <a:schemeClr val="accent1">
+                <a:shade val="50000"/>
+              </a:schemeClr>
+            </a:lnRef>
+            <a:fillRef idx="1">
+              <a:schemeClr val="accent1"/>
+            </a:fillRef>
+            <a:effectRef idx="0">
+              <a:schemeClr val="accent1"/>
+            </a:effectRef>
+            <a:fontRef idx="minor">
+              <a:schemeClr val="lt1"/>
+            </a:fontRef>
+          </p:style>
+          <p:txBody>
+            <a:bodyPr rtlCol="0" anchor="ctr"/>
+            <a:lstStyle/>
+            <a:p>
+              <a:pPr algn="ctr"/>
+              <a:endParaRPr lang="en-US" dirty="0">
+                <a:solidFill>
+                  <a:schemeClr val="tx1"/>
+                </a:solidFill>
+              </a:endParaRPr>
+            </a:p>
+          </p:txBody>
+        </p:sp>
+        <p:sp>
+          <p:nvSpPr>
+            <p:cNvPr id="8" name="Flowchart: Card 7"/>
+            <p:cNvSpPr/>
+            <p:nvPr/>
+          </p:nvSpPr>
+          <p:spPr>
+            <a:xfrm>
+              <a:off x="1295400" y="1295400"/>
+              <a:ext cx="1371600" cy="804672"/>
+            </a:xfrm>
+            <a:prstGeom prst="flowChartPunchedCard">
+              <a:avLst/>
+            </a:prstGeom>
+            <a:solidFill>
+              <a:schemeClr val="bg1"/>
+            </a:solidFill>
+            <a:ln>
+              <a:solidFill>
+                <a:schemeClr val="tx1"/>
+              </a:solidFill>
+            </a:ln>
+          </p:spPr>
+          <p:style>
+            <a:lnRef idx="2">
+              <a:schemeClr val="accent1">
+                <a:shade val="50000"/>
+              </a:schemeClr>
+            </a:lnRef>
+            <a:fillRef idx="1">
+              <a:schemeClr val="accent1"/>
+            </a:fillRef>
+            <a:effectRef idx="0">
+              <a:schemeClr val="accent1"/>
+            </a:effectRef>
+            <a:fontRef idx="minor">
+              <a:schemeClr val="lt1"/>
+            </a:fontRef>
+          </p:style>
+          <p:txBody>
+            <a:bodyPr rtlCol="0" anchor="ctr"/>
+            <a:lstStyle/>
+            <a:p>
+              <a:pPr algn="ctr"/>
+              <a:endParaRPr lang="en-US" dirty="0">
+                <a:solidFill>
+                  <a:schemeClr val="tx1"/>
+                </a:solidFill>
+              </a:endParaRPr>
+            </a:p>
+          </p:txBody>
+        </p:sp>
+        <p:sp>
+          <p:nvSpPr>
+            <p:cNvPr id="9" name="Flowchart: Card 8"/>
+            <p:cNvSpPr/>
+            <p:nvPr/>
+          </p:nvSpPr>
+          <p:spPr>
+            <a:xfrm>
+              <a:off x="1371600" y="1371600"/>
+              <a:ext cx="1371600" cy="804672"/>
+            </a:xfrm>
+            <a:prstGeom prst="flowChartPunchedCard">
+              <a:avLst/>
+            </a:prstGeom>
+            <a:solidFill>
+              <a:schemeClr val="bg1"/>
+            </a:solidFill>
+            <a:ln>
+              <a:solidFill>
+                <a:schemeClr val="tx1"/>
+              </a:solidFill>
+            </a:ln>
+          </p:spPr>
+          <p:style>
+            <a:lnRef idx="2">
+              <a:schemeClr val="accent1">
+                <a:shade val="50000"/>
+              </a:schemeClr>
+            </a:lnRef>
+            <a:fillRef idx="1">
+              <a:schemeClr val="accent1"/>
+            </a:fillRef>
+            <a:effectRef idx="0">
+              <a:schemeClr val="accent1"/>
+            </a:effectRef>
+            <a:fontRef idx="minor">
+              <a:schemeClr val="lt1"/>
+            </a:fontRef>
+          </p:style>
+          <p:txBody>
+            <a:bodyPr rtlCol="0" anchor="ctr"/>
+            <a:lstStyle/>
+            <a:p>
+              <a:pPr algn="ctr"/>
+              <a:r>
+                <a:rPr lang="en-US" dirty="0">
+                  <a:solidFill>
+                    <a:schemeClr val="tx1"/>
+                  </a:solidFill>
+                </a:rPr>
+                <a:t>Organization</a:t>
+              </a:r>
+            </a:p>
+          </p:txBody>
+        </p:sp>
+      </p:grpSp>
+      <p:cxnSp>
+        <p:nvCxnSpPr>
+          <p:cNvPr id="14" name="Elbow Connector 13"/>
+          <p:cNvCxnSpPr>
+            <a:stCxn id="5" idx="0"/>
+            <a:endCxn id="8" idx="1"/>
+          </p:cNvCxnSpPr>
+          <p:nvPr/>
+        </p:nvCxnSpPr>
+        <p:spPr>
+          <a:xfrm rot="16200000" flipH="1" flipV="1">
+            <a:off x="4885840" y="1902127"/>
+            <a:ext cx="288298" cy="609600"/>
+          </a:xfrm>
+          <a:prstGeom prst="bentConnector4">
+            <a:avLst>
+              <a:gd name="adj1" fmla="val -79293"/>
+              <a:gd name="adj2" fmla="val 150000"/>
+            </a:avLst>
+          </a:prstGeom>
+          <a:ln>
+            <a:solidFill>
+              <a:schemeClr val="accent2"/>
+            </a:solidFill>
+            <a:tailEnd type="arrow"/>
+          </a:ln>
+        </p:spPr>
+        <p:style>
+          <a:lnRef idx="1">
+            <a:schemeClr val="accent1"/>
+          </a:lnRef>
+          <a:fillRef idx="0">
+            <a:schemeClr val="accent1"/>
+          </a:fillRef>
+          <a:effectRef idx="0">
+            <a:schemeClr val="accent1"/>
+          </a:effectRef>
+          <a:fontRef idx="minor">
+            <a:schemeClr val="tx1"/>
+          </a:fontRef>
+        </p:style>
+      </p:cxnSp>
+      <p:sp>
+        <p:nvSpPr>
+          <p:cNvPr id="19" name="TextBox 18"/>
+          <p:cNvSpPr txBox="1"/>
+          <p:nvPr/>
+        </p:nvSpPr>
+        <p:spPr>
+          <a:xfrm>
+            <a:off x="4426862" y="1626645"/>
+            <a:ext cx="535724" cy="246221"/>
+          </a:xfrm>
+          <a:prstGeom prst="rect">
+            <a:avLst/>
+          </a:prstGeom>
+          <a:noFill/>
+        </p:spPr>
+        <p:txBody>
+          <a:bodyPr wrap="none" rtlCol="0">
+            <a:spAutoFit/>
+          </a:bodyPr>
+          <a:lstStyle/>
+          <a:p>
+            <a:r>
+              <a:rPr lang="en-US" sz="1000" dirty="0">
+                <a:solidFill>
+                  <a:schemeClr val="accent2"/>
+                </a:solidFill>
+              </a:rPr>
+              <a:t>part of</a:t>
+            </a:r>
+          </a:p>
+        </p:txBody>
+      </p:sp>
+      <p:grpSp>
+        <p:nvGrpSpPr>
+          <p:cNvPr id="21" name="Group 20"/>
+          <p:cNvGrpSpPr/>
+          <p:nvPr/>
+        </p:nvGrpSpPr>
+        <p:grpSpPr>
+          <a:xfrm>
+            <a:off x="4648989" y="3860348"/>
+            <a:ext cx="1524000" cy="576596"/>
+            <a:chOff x="1219200" y="1219200"/>
+            <a:chExt cx="1524000" cy="957072"/>
+          </a:xfrm>
+        </p:grpSpPr>
+        <p:sp>
+          <p:nvSpPr>
+            <p:cNvPr id="22" name="Flowchart: Card 21"/>
+            <p:cNvSpPr/>
+            <p:nvPr/>
+          </p:nvSpPr>
+          <p:spPr>
+            <a:xfrm>
+              <a:off x="1219200" y="1219200"/>
+              <a:ext cx="1371600" cy="804672"/>
+            </a:xfrm>
+            <a:prstGeom prst="flowChartPunchedCard">
+              <a:avLst/>
+            </a:prstGeom>
+            <a:solidFill>
+              <a:schemeClr val="bg1"/>
+            </a:solidFill>
+            <a:ln>
+              <a:solidFill>
+                <a:schemeClr val="tx1"/>
+              </a:solidFill>
+            </a:ln>
+          </p:spPr>
+          <p:style>
+            <a:lnRef idx="2">
+              <a:schemeClr val="accent1">
+                <a:shade val="50000"/>
+              </a:schemeClr>
+            </a:lnRef>
+            <a:fillRef idx="1">
+              <a:schemeClr val="accent1"/>
+            </a:fillRef>
+            <a:effectRef idx="0">
+              <a:schemeClr val="accent1"/>
+            </a:effectRef>
+            <a:fontRef idx="minor">
+              <a:schemeClr val="lt1"/>
+            </a:fontRef>
+          </p:style>
+          <p:txBody>
+            <a:bodyPr rtlCol="0" anchor="ctr"/>
+            <a:lstStyle/>
+            <a:p>
+              <a:pPr algn="ctr"/>
+              <a:endParaRPr lang="en-US" dirty="0">
+                <a:solidFill>
+                  <a:schemeClr val="tx1"/>
+                </a:solidFill>
+              </a:endParaRPr>
+            </a:p>
+          </p:txBody>
+        </p:sp>
+        <p:sp>
+          <p:nvSpPr>
+            <p:cNvPr id="23" name="Flowchart: Card 22"/>
+            <p:cNvSpPr/>
+            <p:nvPr/>
+          </p:nvSpPr>
+          <p:spPr>
+            <a:xfrm>
+              <a:off x="1295400" y="1295400"/>
+              <a:ext cx="1371600" cy="804672"/>
+            </a:xfrm>
+            <a:prstGeom prst="flowChartPunchedCard">
+              <a:avLst/>
+            </a:prstGeom>
+            <a:solidFill>
+              <a:schemeClr val="bg1"/>
+            </a:solidFill>
+            <a:ln>
+              <a:solidFill>
+                <a:schemeClr val="tx1"/>
+              </a:solidFill>
+            </a:ln>
+          </p:spPr>
+          <p:style>
+            <a:lnRef idx="2">
+              <a:schemeClr val="accent1">
+                <a:shade val="50000"/>
+              </a:schemeClr>
+            </a:lnRef>
+            <a:fillRef idx="1">
+              <a:schemeClr val="accent1"/>
+            </a:fillRef>
+            <a:effectRef idx="0">
+              <a:schemeClr val="accent1"/>
+            </a:effectRef>
+            <a:fontRef idx="minor">
+              <a:schemeClr val="lt1"/>
+            </a:fontRef>
+          </p:style>
+          <p:txBody>
+            <a:bodyPr rtlCol="0" anchor="ctr"/>
+            <a:lstStyle/>
+            <a:p>
+              <a:pPr algn="ctr"/>
+              <a:endParaRPr lang="en-US" dirty="0">
+                <a:solidFill>
+                  <a:schemeClr val="tx1"/>
+                </a:solidFill>
+              </a:endParaRPr>
+            </a:p>
+          </p:txBody>
+        </p:sp>
+        <p:sp>
+          <p:nvSpPr>
+            <p:cNvPr id="24" name="Flowchart: Card 23"/>
+            <p:cNvSpPr/>
+            <p:nvPr/>
+          </p:nvSpPr>
+          <p:spPr>
+            <a:xfrm>
+              <a:off x="1371600" y="1371600"/>
+              <a:ext cx="1371600" cy="804672"/>
+            </a:xfrm>
+            <a:prstGeom prst="flowChartPunchedCard">
+              <a:avLst/>
+            </a:prstGeom>
+            <a:solidFill>
+              <a:schemeClr val="bg1"/>
+            </a:solidFill>
+            <a:ln>
+              <a:solidFill>
+                <a:schemeClr val="tx1"/>
+              </a:solidFill>
+            </a:ln>
+          </p:spPr>
+          <p:style>
+            <a:lnRef idx="2">
+              <a:schemeClr val="accent1">
+                <a:shade val="50000"/>
+              </a:schemeClr>
+            </a:lnRef>
+            <a:fillRef idx="1">
+              <a:schemeClr val="accent1"/>
+            </a:fillRef>
+            <a:effectRef idx="0">
+              <a:schemeClr val="accent1"/>
+            </a:effectRef>
+            <a:fontRef idx="minor">
+              <a:schemeClr val="lt1"/>
+            </a:fontRef>
+          </p:style>
+          <p:txBody>
+            <a:bodyPr rtlCol="0" anchor="ctr"/>
+            <a:lstStyle/>
+            <a:p>
+              <a:pPr algn="ctr"/>
+              <a:r>
+                <a:rPr lang="en-US" dirty="0">
+                  <a:solidFill>
+                    <a:schemeClr val="tx1"/>
+                  </a:solidFill>
+                </a:rPr>
+                <a:t>Facility</a:t>
+              </a:r>
+              <a:endParaRPr lang="en-US" sz="1400" dirty="0">
+                <a:solidFill>
+                  <a:schemeClr val="tx1"/>
+                </a:solidFill>
+              </a:endParaRPr>
+            </a:p>
+          </p:txBody>
+        </p:sp>
+      </p:grpSp>
+      <p:grpSp>
+        <p:nvGrpSpPr>
+          <p:cNvPr id="25" name="Group 24"/>
+          <p:cNvGrpSpPr/>
+          <p:nvPr/>
+        </p:nvGrpSpPr>
+        <p:grpSpPr>
+          <a:xfrm>
+            <a:off x="4648989" y="5555961"/>
+            <a:ext cx="1524000" cy="576596"/>
+            <a:chOff x="1219200" y="1219200"/>
+            <a:chExt cx="1524000" cy="957072"/>
+          </a:xfrm>
+        </p:grpSpPr>
+        <p:sp>
+          <p:nvSpPr>
+            <p:cNvPr id="26" name="Flowchart: Card 25"/>
+            <p:cNvSpPr/>
+            <p:nvPr/>
+          </p:nvSpPr>
+          <p:spPr>
+            <a:xfrm>
+              <a:off x="1219200" y="1219200"/>
+              <a:ext cx="1371600" cy="804672"/>
+            </a:xfrm>
+            <a:prstGeom prst="flowChartPunchedCard">
+              <a:avLst/>
+            </a:prstGeom>
+            <a:solidFill>
+              <a:schemeClr val="bg1"/>
+            </a:solidFill>
+            <a:ln>
+              <a:solidFill>
+                <a:schemeClr val="tx1"/>
+              </a:solidFill>
+            </a:ln>
+          </p:spPr>
+          <p:style>
+            <a:lnRef idx="2">
+              <a:schemeClr val="accent1">
+                <a:shade val="50000"/>
+              </a:schemeClr>
+            </a:lnRef>
+            <a:fillRef idx="1">
+              <a:schemeClr val="accent1"/>
+            </a:fillRef>
+            <a:effectRef idx="0">
+              <a:schemeClr val="accent1"/>
+            </a:effectRef>
+            <a:fontRef idx="minor">
+              <a:schemeClr val="lt1"/>
+            </a:fontRef>
+          </p:style>
+          <p:txBody>
+            <a:bodyPr rtlCol="0" anchor="ctr"/>
+            <a:lstStyle/>
+            <a:p>
+              <a:pPr algn="ctr"/>
+              <a:endParaRPr lang="en-US" dirty="0">
+                <a:solidFill>
+                  <a:schemeClr val="tx1"/>
+                </a:solidFill>
+              </a:endParaRPr>
+            </a:p>
+          </p:txBody>
+        </p:sp>
+        <p:sp>
+          <p:nvSpPr>
+            <p:cNvPr id="27" name="Flowchart: Card 26"/>
+            <p:cNvSpPr/>
+            <p:nvPr/>
+          </p:nvSpPr>
+          <p:spPr>
+            <a:xfrm>
+              <a:off x="1295400" y="1295400"/>
+              <a:ext cx="1371600" cy="804672"/>
+            </a:xfrm>
+            <a:prstGeom prst="flowChartPunchedCard">
+              <a:avLst/>
+            </a:prstGeom>
+            <a:solidFill>
+              <a:schemeClr val="bg1"/>
+            </a:solidFill>
+            <a:ln>
+              <a:solidFill>
+                <a:schemeClr val="tx1"/>
+              </a:solidFill>
+            </a:ln>
+          </p:spPr>
+          <p:style>
+            <a:lnRef idx="2">
+              <a:schemeClr val="accent1">
+                <a:shade val="50000"/>
+              </a:schemeClr>
+            </a:lnRef>
+            <a:fillRef idx="1">
+              <a:schemeClr val="accent1"/>
+            </a:fillRef>
+            <a:effectRef idx="0">
+              <a:schemeClr val="accent1"/>
+            </a:effectRef>
+            <a:fontRef idx="minor">
+              <a:schemeClr val="lt1"/>
+            </a:fontRef>
+          </p:style>
+          <p:txBody>
+            <a:bodyPr rtlCol="0" anchor="ctr"/>
+            <a:lstStyle/>
+            <a:p>
+              <a:pPr algn="ctr"/>
+              <a:endParaRPr lang="en-US" dirty="0">
+                <a:solidFill>
+                  <a:schemeClr val="tx1"/>
+                </a:solidFill>
+              </a:endParaRPr>
+            </a:p>
+          </p:txBody>
+        </p:sp>
+        <p:sp>
+          <p:nvSpPr>
+            <p:cNvPr id="28" name="Flowchart: Card 27"/>
+            <p:cNvSpPr/>
+            <p:nvPr/>
+          </p:nvSpPr>
+          <p:spPr>
+            <a:xfrm>
+              <a:off x="1371600" y="1371600"/>
+              <a:ext cx="1371600" cy="804672"/>
+            </a:xfrm>
+            <a:prstGeom prst="flowChartPunchedCard">
+              <a:avLst/>
+            </a:prstGeom>
+            <a:solidFill>
+              <a:schemeClr val="bg1"/>
+            </a:solidFill>
+            <a:ln>
+              <a:solidFill>
+                <a:schemeClr val="tx1"/>
+              </a:solidFill>
+            </a:ln>
+          </p:spPr>
+          <p:style>
+            <a:lnRef idx="2">
+              <a:schemeClr val="accent1">
+                <a:shade val="50000"/>
+              </a:schemeClr>
+            </a:lnRef>
+            <a:fillRef idx="1">
+              <a:schemeClr val="accent1"/>
+            </a:fillRef>
+            <a:effectRef idx="0">
+              <a:schemeClr val="accent1"/>
+            </a:effectRef>
+            <a:fontRef idx="minor">
+              <a:schemeClr val="lt1"/>
+            </a:fontRef>
+          </p:style>
+          <p:txBody>
+            <a:bodyPr rtlCol="0" anchor="ctr"/>
+            <a:lstStyle/>
+            <a:p>
+              <a:pPr algn="ctr"/>
+              <a:r>
+                <a:rPr lang="en-US" dirty="0">
+                  <a:solidFill>
+                    <a:schemeClr val="tx1"/>
+                  </a:solidFill>
+                </a:rPr>
+                <a:t>Service</a:t>
+              </a:r>
+              <a:endParaRPr lang="en-US" sz="1200" dirty="0">
+                <a:solidFill>
+                  <a:schemeClr val="tx1"/>
+                </a:solidFill>
+              </a:endParaRPr>
+            </a:p>
+          </p:txBody>
+        </p:sp>
+      </p:grpSp>
+      <p:grpSp>
+        <p:nvGrpSpPr>
+          <p:cNvPr id="29" name="Group 28"/>
+          <p:cNvGrpSpPr/>
+          <p:nvPr/>
+        </p:nvGrpSpPr>
+        <p:grpSpPr>
+          <a:xfrm>
+            <a:off x="7620000" y="3877319"/>
+            <a:ext cx="1524000" cy="576596"/>
+            <a:chOff x="1219200" y="1219200"/>
+            <a:chExt cx="1524000" cy="957071"/>
+          </a:xfrm>
+        </p:grpSpPr>
+        <p:sp>
+          <p:nvSpPr>
+            <p:cNvPr id="30" name="Flowchart: Card 29"/>
+            <p:cNvSpPr/>
+            <p:nvPr/>
+          </p:nvSpPr>
+          <p:spPr>
+            <a:xfrm>
+              <a:off x="1219200" y="1219200"/>
+              <a:ext cx="1371600" cy="804672"/>
+            </a:xfrm>
+            <a:prstGeom prst="flowChartPunchedCard">
+              <a:avLst/>
+            </a:prstGeom>
+            <a:solidFill>
+              <a:schemeClr val="bg1"/>
+            </a:solidFill>
+            <a:ln>
+              <a:solidFill>
+                <a:schemeClr val="tx1"/>
+              </a:solidFill>
+            </a:ln>
+          </p:spPr>
+          <p:style>
+            <a:lnRef idx="2">
+              <a:schemeClr val="accent1">
+                <a:shade val="50000"/>
+              </a:schemeClr>
+            </a:lnRef>
+            <a:fillRef idx="1">
+              <a:schemeClr val="accent1"/>
+            </a:fillRef>
+            <a:effectRef idx="0">
+              <a:schemeClr val="accent1"/>
+            </a:effectRef>
+            <a:fontRef idx="minor">
+              <a:schemeClr val="lt1"/>
+            </a:fontRef>
+          </p:style>
+          <p:txBody>
+            <a:bodyPr rtlCol="0" anchor="ctr"/>
+            <a:lstStyle/>
+            <a:p>
+              <a:pPr algn="ctr"/>
+              <a:endParaRPr lang="en-US" dirty="0">
+                <a:solidFill>
+                  <a:schemeClr val="tx1"/>
+                </a:solidFill>
+              </a:endParaRPr>
+            </a:p>
+          </p:txBody>
+        </p:sp>
+        <p:sp>
+          <p:nvSpPr>
+            <p:cNvPr id="31" name="Flowchart: Card 30"/>
+            <p:cNvSpPr/>
+            <p:nvPr/>
+          </p:nvSpPr>
+          <p:spPr>
+            <a:xfrm>
+              <a:off x="1295400" y="1295400"/>
+              <a:ext cx="1371600" cy="804672"/>
+            </a:xfrm>
+            <a:prstGeom prst="flowChartPunchedCard">
+              <a:avLst/>
+            </a:prstGeom>
+            <a:solidFill>
+              <a:schemeClr val="bg1"/>
+            </a:solidFill>
+            <a:ln>
+              <a:solidFill>
+                <a:schemeClr val="tx1"/>
+              </a:solidFill>
+            </a:ln>
+          </p:spPr>
+          <p:style>
+            <a:lnRef idx="2">
+              <a:schemeClr val="accent1">
+                <a:shade val="50000"/>
+              </a:schemeClr>
+            </a:lnRef>
+            <a:fillRef idx="1">
+              <a:schemeClr val="accent1"/>
+            </a:fillRef>
+            <a:effectRef idx="0">
+              <a:schemeClr val="accent1"/>
+            </a:effectRef>
+            <a:fontRef idx="minor">
+              <a:schemeClr val="lt1"/>
+            </a:fontRef>
+          </p:style>
+          <p:txBody>
+            <a:bodyPr rtlCol="0" anchor="ctr"/>
+            <a:lstStyle/>
+            <a:p>
+              <a:pPr algn="ctr"/>
+              <a:endParaRPr lang="en-US" dirty="0">
+                <a:solidFill>
+                  <a:schemeClr val="tx1"/>
+                </a:solidFill>
+              </a:endParaRPr>
+            </a:p>
+          </p:txBody>
+        </p:sp>
+        <p:sp>
+          <p:nvSpPr>
+            <p:cNvPr id="32" name="Flowchart: Card 31"/>
+            <p:cNvSpPr/>
+            <p:nvPr/>
+          </p:nvSpPr>
+          <p:spPr>
+            <a:xfrm>
+              <a:off x="1371600" y="1371600"/>
+              <a:ext cx="1371600" cy="804671"/>
+            </a:xfrm>
+            <a:prstGeom prst="flowChartPunchedCard">
+              <a:avLst/>
+            </a:prstGeom>
+            <a:solidFill>
+              <a:schemeClr val="bg1"/>
+            </a:solidFill>
+            <a:ln>
+              <a:solidFill>
+                <a:schemeClr val="tx1"/>
+              </a:solidFill>
+            </a:ln>
+          </p:spPr>
+          <p:style>
+            <a:lnRef idx="2">
+              <a:schemeClr val="accent1">
+                <a:shade val="50000"/>
+              </a:schemeClr>
+            </a:lnRef>
+            <a:fillRef idx="1">
+              <a:schemeClr val="accent1"/>
+            </a:fillRef>
+            <a:effectRef idx="0">
+              <a:schemeClr val="accent1"/>
+            </a:effectRef>
+            <a:fontRef idx="minor">
+              <a:schemeClr val="lt1"/>
+            </a:fontRef>
+          </p:style>
+          <p:txBody>
+            <a:bodyPr rtlCol="0" anchor="ctr"/>
+            <a:lstStyle/>
+            <a:p>
+              <a:pPr algn="ctr"/>
+              <a:r>
+                <a:rPr lang="en-US" dirty="0">
+                  <a:solidFill>
+                    <a:schemeClr val="tx1"/>
+                  </a:solidFill>
+                </a:rPr>
+                <a:t>Practitioner</a:t>
+              </a:r>
+            </a:p>
+          </p:txBody>
+        </p:sp>
+      </p:grpSp>
+      <p:cxnSp>
+        <p:nvCxnSpPr>
+          <p:cNvPr id="34" name="Straight Arrow Connector 33"/>
+          <p:cNvCxnSpPr>
+            <a:stCxn id="28" idx="0"/>
+            <a:endCxn id="24" idx="2"/>
+          </p:cNvCxnSpPr>
+          <p:nvPr/>
+        </p:nvCxnSpPr>
+        <p:spPr>
+          <a:xfrm flipV="1">
+            <a:off x="5487189" y="4436944"/>
+            <a:ext cx="0" cy="1210832"/>
+          </a:xfrm>
+          <a:prstGeom prst="straightConnector1">
+            <a:avLst/>
+          </a:prstGeom>
+          <a:ln>
+            <a:solidFill>
+              <a:schemeClr val="tx1"/>
+            </a:solidFill>
+            <a:tailEnd type="arrow"/>
+          </a:ln>
+        </p:spPr>
+        <p:style>
+          <a:lnRef idx="1">
+            <a:schemeClr val="accent1"/>
+          </a:lnRef>
+          <a:fillRef idx="0">
+            <a:schemeClr val="accent1"/>
+          </a:fillRef>
+          <a:effectRef idx="0">
+            <a:schemeClr val="accent1"/>
+          </a:effectRef>
+          <a:fontRef idx="minor">
+            <a:schemeClr val="tx1"/>
+          </a:fontRef>
+        </p:style>
+      </p:cxnSp>
+      <p:cxnSp>
+        <p:nvCxnSpPr>
+          <p:cNvPr id="38" name="Straight Arrow Connector 37"/>
+          <p:cNvCxnSpPr>
+            <a:stCxn id="24" idx="0"/>
+            <a:endCxn id="9" idx="2"/>
+          </p:cNvCxnSpPr>
+          <p:nvPr/>
+        </p:nvCxnSpPr>
+        <p:spPr>
+          <a:xfrm flipV="1">
+            <a:off x="5487189" y="2639375"/>
+            <a:ext cx="0" cy="1312789"/>
+          </a:xfrm>
+          <a:prstGeom prst="straightConnector1">
+            <a:avLst/>
+          </a:prstGeom>
+          <a:ln>
+            <a:solidFill>
+              <a:schemeClr val="tx1"/>
+            </a:solidFill>
+            <a:tailEnd type="arrow"/>
+          </a:ln>
+        </p:spPr>
+        <p:style>
+          <a:lnRef idx="1">
+            <a:schemeClr val="accent1"/>
+          </a:lnRef>
+          <a:fillRef idx="0">
+            <a:schemeClr val="accent1"/>
+          </a:fillRef>
+          <a:effectRef idx="0">
+            <a:schemeClr val="accent1"/>
+          </a:effectRef>
+          <a:fontRef idx="minor">
+            <a:schemeClr val="tx1"/>
+          </a:fontRef>
+        </p:style>
+      </p:cxnSp>
+      <p:sp>
+        <p:nvSpPr>
+          <p:cNvPr id="41" name="TextBox 40"/>
+          <p:cNvSpPr txBox="1"/>
+          <p:nvPr/>
+        </p:nvSpPr>
+        <p:spPr>
+          <a:xfrm>
+            <a:off x="5263329" y="3022883"/>
+            <a:ext cx="338554" cy="441788"/>
+          </a:xfrm>
+          <a:prstGeom prst="rect">
+            <a:avLst/>
+          </a:prstGeom>
+          <a:noFill/>
+        </p:spPr>
+        <p:txBody>
+          <a:bodyPr vert="vert270" wrap="none" rtlCol="0">
+            <a:spAutoFit/>
+          </a:bodyPr>
+          <a:lstStyle/>
+          <a:p>
+            <a:r>
+              <a:rPr lang="en-US" sz="1000" dirty="0"/>
+              <a:t>Part of</a:t>
+            </a:r>
+          </a:p>
+        </p:txBody>
+      </p:sp>
+      <p:sp>
+        <p:nvSpPr>
+          <p:cNvPr id="67" name="TextBox 66"/>
+          <p:cNvSpPr txBox="1"/>
+          <p:nvPr/>
+        </p:nvSpPr>
+        <p:spPr>
+          <a:xfrm>
+            <a:off x="5267318" y="4607671"/>
+            <a:ext cx="338554" cy="712696"/>
+          </a:xfrm>
+          <a:prstGeom prst="rect">
+            <a:avLst/>
+          </a:prstGeom>
+          <a:noFill/>
+        </p:spPr>
+        <p:txBody>
+          <a:bodyPr vert="vert270" wrap="none" rtlCol="0">
+            <a:spAutoFit/>
+          </a:bodyPr>
+          <a:lstStyle/>
+          <a:p>
+            <a:r>
+              <a:rPr lang="en-US" sz="1000" dirty="0"/>
+              <a:t>delivered at</a:t>
+            </a:r>
+          </a:p>
+        </p:txBody>
+      </p:sp>
+      <p:cxnSp>
+        <p:nvCxnSpPr>
+          <p:cNvPr id="69" name="Elbow Connector 68"/>
+          <p:cNvCxnSpPr>
+            <a:cxnSpLocks/>
+            <a:stCxn id="28" idx="1"/>
+            <a:endCxn id="8" idx="1"/>
+          </p:cNvCxnSpPr>
+          <p:nvPr/>
+        </p:nvCxnSpPr>
+        <p:spPr>
+          <a:xfrm rot="10800000">
+            <a:off x="4725189" y="2351078"/>
+            <a:ext cx="76200" cy="3539091"/>
+          </a:xfrm>
+          <a:prstGeom prst="bentConnector3">
+            <a:avLst>
+              <a:gd name="adj1" fmla="val 3193043"/>
+            </a:avLst>
+          </a:prstGeom>
+          <a:ln>
+            <a:solidFill>
+              <a:schemeClr val="tx1"/>
+            </a:solidFill>
+            <a:tailEnd type="arrow"/>
+          </a:ln>
+        </p:spPr>
+        <p:style>
+          <a:lnRef idx="1">
+            <a:schemeClr val="accent1"/>
+          </a:lnRef>
+          <a:fillRef idx="0">
+            <a:schemeClr val="accent1"/>
+          </a:fillRef>
+          <a:effectRef idx="0">
+            <a:schemeClr val="accent1"/>
+          </a:effectRef>
+          <a:fontRef idx="minor">
+            <a:schemeClr val="tx1"/>
+          </a:fontRef>
+        </p:style>
+      </p:cxnSp>
+      <p:sp>
+        <p:nvSpPr>
+          <p:cNvPr id="73" name="TextBox 72"/>
+          <p:cNvSpPr txBox="1"/>
+          <p:nvPr/>
+        </p:nvSpPr>
+        <p:spPr>
+          <a:xfrm>
+            <a:off x="2129973" y="3651009"/>
+            <a:ext cx="338554" cy="711092"/>
+          </a:xfrm>
+          <a:prstGeom prst="rect">
+            <a:avLst/>
+          </a:prstGeom>
+          <a:noFill/>
+        </p:spPr>
+        <p:txBody>
+          <a:bodyPr vert="vert270" wrap="none" rtlCol="0">
+            <a:spAutoFit/>
+          </a:bodyPr>
+          <a:lstStyle/>
+          <a:p>
+            <a:r>
+              <a:rPr lang="en-US" sz="1000" dirty="0"/>
+              <a:t>provided by</a:t>
+            </a:r>
+          </a:p>
+        </p:txBody>
+      </p:sp>
+      <p:cxnSp>
+        <p:nvCxnSpPr>
+          <p:cNvPr id="75" name="Elbow Connector 74"/>
+          <p:cNvCxnSpPr>
+            <a:cxnSpLocks/>
+            <a:endCxn id="9" idx="3"/>
+          </p:cNvCxnSpPr>
+          <p:nvPr/>
+        </p:nvCxnSpPr>
+        <p:spPr>
+          <a:xfrm rot="16200000" flipV="1">
+            <a:off x="6521288" y="2048686"/>
+            <a:ext cx="1572150" cy="2268747"/>
+          </a:xfrm>
+          <a:prstGeom prst="bentConnector2">
+            <a:avLst/>
+          </a:prstGeom>
+          <a:ln>
+            <a:solidFill>
+              <a:schemeClr val="tx1"/>
+            </a:solidFill>
+            <a:tailEnd type="arrow"/>
+          </a:ln>
+        </p:spPr>
+        <p:style>
+          <a:lnRef idx="1">
+            <a:schemeClr val="accent1"/>
+          </a:lnRef>
+          <a:fillRef idx="0">
+            <a:schemeClr val="accent1"/>
+          </a:fillRef>
+          <a:effectRef idx="0">
+            <a:schemeClr val="accent1"/>
+          </a:effectRef>
+          <a:fontRef idx="minor">
+            <a:schemeClr val="tx1"/>
+          </a:fontRef>
+        </p:style>
+      </p:cxnSp>
+      <p:sp>
+        <p:nvSpPr>
+          <p:cNvPr id="78" name="TextBox 77"/>
+          <p:cNvSpPr txBox="1"/>
+          <p:nvPr/>
+        </p:nvSpPr>
+        <p:spPr>
+          <a:xfrm>
+            <a:off x="7665456" y="2182058"/>
+            <a:ext cx="822661" cy="246221"/>
+          </a:xfrm>
+          <a:prstGeom prst="rect">
+            <a:avLst/>
+          </a:prstGeom>
+          <a:noFill/>
+        </p:spPr>
+        <p:txBody>
+          <a:bodyPr wrap="none" rtlCol="0">
+            <a:spAutoFit/>
+          </a:bodyPr>
+          <a:lstStyle/>
+          <a:p>
+            <a:r>
+              <a:rPr lang="en-US" sz="1000" dirty="0"/>
+              <a:t>managed by</a:t>
+            </a:r>
+          </a:p>
+        </p:txBody>
+      </p:sp>
+      <p:cxnSp>
+        <p:nvCxnSpPr>
+          <p:cNvPr id="80" name="Straight Arrow Connector 79"/>
+          <p:cNvCxnSpPr>
+            <a:cxnSpLocks/>
+            <a:endCxn id="24" idx="3"/>
+          </p:cNvCxnSpPr>
+          <p:nvPr/>
+        </p:nvCxnSpPr>
+        <p:spPr>
+          <a:xfrm flipH="1" flipV="1">
+            <a:off x="6172990" y="4194555"/>
+            <a:ext cx="1582947" cy="16971"/>
+          </a:xfrm>
+          <a:prstGeom prst="straightConnector1">
+            <a:avLst/>
+          </a:prstGeom>
+          <a:ln>
+            <a:solidFill>
+              <a:schemeClr val="tx1"/>
+            </a:solidFill>
+            <a:tailEnd type="arrow"/>
+          </a:ln>
+        </p:spPr>
+        <p:style>
+          <a:lnRef idx="1">
+            <a:schemeClr val="accent1"/>
+          </a:lnRef>
+          <a:fillRef idx="0">
+            <a:schemeClr val="accent1"/>
+          </a:fillRef>
+          <a:effectRef idx="0">
+            <a:schemeClr val="accent1"/>
+          </a:effectRef>
+          <a:fontRef idx="minor">
+            <a:schemeClr val="tx1"/>
+          </a:fontRef>
+        </p:style>
+      </p:cxnSp>
+      <p:sp>
+        <p:nvSpPr>
+          <p:cNvPr id="83" name="TextBox 82"/>
+          <p:cNvSpPr txBox="1"/>
+          <p:nvPr/>
+        </p:nvSpPr>
+        <p:spPr>
+          <a:xfrm>
+            <a:off x="6553132" y="3979628"/>
+            <a:ext cx="782587" cy="246221"/>
+          </a:xfrm>
+          <a:prstGeom prst="rect">
+            <a:avLst/>
+          </a:prstGeom>
+          <a:noFill/>
+        </p:spPr>
+        <p:txBody>
+          <a:bodyPr wrap="none" rtlCol="0">
+            <a:spAutoFit/>
+          </a:bodyPr>
+          <a:lstStyle/>
+          <a:p>
+            <a:r>
+              <a:rPr lang="en-US" sz="1000" dirty="0"/>
+              <a:t>provided at</a:t>
+            </a:r>
+          </a:p>
+        </p:txBody>
+      </p:sp>
+      <p:cxnSp>
+        <p:nvCxnSpPr>
+          <p:cNvPr id="85" name="Elbow Connector 84"/>
+          <p:cNvCxnSpPr>
+            <a:cxnSpLocks/>
+            <a:endCxn id="28" idx="3"/>
+          </p:cNvCxnSpPr>
+          <p:nvPr/>
+        </p:nvCxnSpPr>
+        <p:spPr>
+          <a:xfrm rot="5400000">
+            <a:off x="6589237" y="4037669"/>
+            <a:ext cx="1436252" cy="2268747"/>
+          </a:xfrm>
+          <a:prstGeom prst="bentConnector2">
+            <a:avLst/>
+          </a:prstGeom>
+          <a:ln>
+            <a:solidFill>
+              <a:schemeClr val="tx1"/>
+            </a:solidFill>
+            <a:tailEnd type="arrow"/>
+          </a:ln>
+        </p:spPr>
+        <p:style>
+          <a:lnRef idx="1">
+            <a:schemeClr val="accent1"/>
+          </a:lnRef>
+          <a:fillRef idx="0">
+            <a:schemeClr val="accent1"/>
+          </a:fillRef>
+          <a:effectRef idx="0">
+            <a:schemeClr val="accent1"/>
+          </a:effectRef>
+          <a:fontRef idx="minor">
+            <a:schemeClr val="tx1"/>
+          </a:fontRef>
+        </p:style>
+      </p:cxnSp>
+      <p:sp>
+        <p:nvSpPr>
+          <p:cNvPr id="90" name="TextBox 89"/>
+          <p:cNvSpPr txBox="1"/>
+          <p:nvPr/>
+        </p:nvSpPr>
+        <p:spPr>
+          <a:xfrm>
+            <a:off x="6991411" y="5664977"/>
+            <a:ext cx="631904" cy="246221"/>
+          </a:xfrm>
+          <a:prstGeom prst="rect">
+            <a:avLst/>
+          </a:prstGeom>
+          <a:noFill/>
+        </p:spPr>
+        <p:txBody>
+          <a:bodyPr wrap="none" rtlCol="0">
+            <a:spAutoFit/>
+          </a:bodyPr>
+          <a:lstStyle/>
+          <a:p>
+            <a:r>
+              <a:rPr lang="en-US" sz="1000" dirty="0"/>
+              <a:t>provides</a:t>
+            </a:r>
+          </a:p>
+        </p:txBody>
+      </p:sp>
+      <p:sp>
+        <p:nvSpPr>
+          <p:cNvPr id="7" name="TextBox 6">
+            <a:extLst>
+              <a:ext uri="{FF2B5EF4-FFF2-40B4-BE49-F238E27FC236}">
+                <a16:creationId xmlns:a16="http://schemas.microsoft.com/office/drawing/2014/main" id="{520C9602-EADD-4B70-A093-50E2F0739B90}"/>
+              </a:ext>
+            </a:extLst>
+          </p:cNvPr>
+          <p:cNvSpPr txBox="1"/>
+          <p:nvPr/>
+        </p:nvSpPr>
+        <p:spPr>
+          <a:xfrm>
+            <a:off x="6171409" y="2401639"/>
+            <a:ext cx="524773" cy="246221"/>
+          </a:xfrm>
+          <a:prstGeom prst="rect">
+            <a:avLst/>
+          </a:prstGeom>
+          <a:noFill/>
+        </p:spPr>
+        <p:txBody>
+          <a:bodyPr wrap="square" rtlCol="0">
+            <a:spAutoFit/>
+          </a:bodyPr>
+          <a:lstStyle/>
+          <a:p>
+            <a:r>
+              <a:rPr lang="en-US" sz="1000" dirty="0"/>
+              <a:t>[0..*]</a:t>
+            </a:r>
+          </a:p>
+        </p:txBody>
+      </p:sp>
+      <p:sp>
+        <p:nvSpPr>
+          <p:cNvPr id="42" name="TextBox 41">
+            <a:extLst>
+              <a:ext uri="{FF2B5EF4-FFF2-40B4-BE49-F238E27FC236}">
+                <a16:creationId xmlns:a16="http://schemas.microsoft.com/office/drawing/2014/main" id="{1814C717-0D44-4BAA-9D40-AE9171713B1A}"/>
+              </a:ext>
+            </a:extLst>
+          </p:cNvPr>
+          <p:cNvSpPr txBox="1"/>
+          <p:nvPr/>
+        </p:nvSpPr>
+        <p:spPr>
+          <a:xfrm>
+            <a:off x="5468356" y="5365790"/>
+            <a:ext cx="458780" cy="246221"/>
+          </a:xfrm>
+          <a:prstGeom prst="rect">
+            <a:avLst/>
+          </a:prstGeom>
+          <a:noFill/>
+        </p:spPr>
+        <p:txBody>
+          <a:bodyPr wrap="none" rtlCol="0">
+            <a:spAutoFit/>
+          </a:bodyPr>
+          <a:lstStyle/>
+          <a:p>
+            <a:r>
+              <a:rPr lang="en-US" sz="1000" dirty="0"/>
+              <a:t>[0..*]</a:t>
+            </a:r>
+          </a:p>
+        </p:txBody>
+      </p:sp>
+      <p:sp>
+        <p:nvSpPr>
+          <p:cNvPr id="44" name="TextBox 43">
+            <a:extLst>
+              <a:ext uri="{FF2B5EF4-FFF2-40B4-BE49-F238E27FC236}">
+                <a16:creationId xmlns:a16="http://schemas.microsoft.com/office/drawing/2014/main" id="{33715178-023E-4227-94F9-BF747DCFFB39}"/>
+              </a:ext>
+            </a:extLst>
+          </p:cNvPr>
+          <p:cNvSpPr txBox="1"/>
+          <p:nvPr/>
+        </p:nvSpPr>
+        <p:spPr>
+          <a:xfrm>
+            <a:off x="6121078" y="4169801"/>
+            <a:ext cx="458780" cy="246221"/>
+          </a:xfrm>
+          <a:prstGeom prst="rect">
+            <a:avLst/>
+          </a:prstGeom>
+          <a:noFill/>
+        </p:spPr>
+        <p:txBody>
+          <a:bodyPr wrap="none" rtlCol="0">
+            <a:spAutoFit/>
+          </a:bodyPr>
+          <a:lstStyle/>
+          <a:p>
+            <a:r>
+              <a:rPr lang="en-US" sz="1000" dirty="0"/>
+              <a:t>[0..*]</a:t>
+            </a:r>
+          </a:p>
+        </p:txBody>
+      </p:sp>
+      <p:sp>
+        <p:nvSpPr>
+          <p:cNvPr id="45" name="TextBox 44">
+            <a:extLst>
+              <a:ext uri="{FF2B5EF4-FFF2-40B4-BE49-F238E27FC236}">
+                <a16:creationId xmlns:a16="http://schemas.microsoft.com/office/drawing/2014/main" id="{6C6735A7-8314-499A-886C-C0590036893A}"/>
+              </a:ext>
+            </a:extLst>
+          </p:cNvPr>
+          <p:cNvSpPr txBox="1"/>
+          <p:nvPr/>
+        </p:nvSpPr>
+        <p:spPr>
+          <a:xfrm>
+            <a:off x="7213257" y="4169801"/>
+            <a:ext cx="458780" cy="246221"/>
+          </a:xfrm>
+          <a:prstGeom prst="rect">
+            <a:avLst/>
+          </a:prstGeom>
+          <a:noFill/>
+        </p:spPr>
+        <p:txBody>
+          <a:bodyPr wrap="none" rtlCol="0">
+            <a:spAutoFit/>
+          </a:bodyPr>
+          <a:lstStyle/>
+          <a:p>
+            <a:r>
+              <a:rPr lang="en-US" sz="1000" dirty="0"/>
+              <a:t>[0..*]</a:t>
+            </a:r>
+          </a:p>
+        </p:txBody>
+      </p:sp>
+      <p:sp>
+        <p:nvSpPr>
+          <p:cNvPr id="46" name="TextBox 45">
+            <a:extLst>
+              <a:ext uri="{FF2B5EF4-FFF2-40B4-BE49-F238E27FC236}">
+                <a16:creationId xmlns:a16="http://schemas.microsoft.com/office/drawing/2014/main" id="{7D8B4640-99B2-4C87-8321-9027506B7D50}"/>
+              </a:ext>
+            </a:extLst>
+          </p:cNvPr>
+          <p:cNvSpPr txBox="1"/>
+          <p:nvPr/>
+        </p:nvSpPr>
+        <p:spPr>
+          <a:xfrm>
+            <a:off x="4259328" y="5892038"/>
+            <a:ext cx="458780" cy="246221"/>
+          </a:xfrm>
+          <a:prstGeom prst="rect">
+            <a:avLst/>
+          </a:prstGeom>
+          <a:noFill/>
+        </p:spPr>
+        <p:txBody>
+          <a:bodyPr wrap="none" rtlCol="0">
+            <a:spAutoFit/>
+          </a:bodyPr>
+          <a:lstStyle/>
+          <a:p>
+            <a:r>
+              <a:rPr lang="en-US" sz="1000" dirty="0"/>
+              <a:t>[0..*]</a:t>
+            </a:r>
+          </a:p>
+        </p:txBody>
+      </p:sp>
+      <p:sp>
+        <p:nvSpPr>
+          <p:cNvPr id="47" name="TextBox 46">
+            <a:extLst>
+              <a:ext uri="{FF2B5EF4-FFF2-40B4-BE49-F238E27FC236}">
+                <a16:creationId xmlns:a16="http://schemas.microsoft.com/office/drawing/2014/main" id="{46792947-5EBD-4B4F-BE5D-2777CD214016}"/>
+              </a:ext>
+            </a:extLst>
+          </p:cNvPr>
+          <p:cNvSpPr txBox="1"/>
+          <p:nvPr/>
+        </p:nvSpPr>
+        <p:spPr>
+          <a:xfrm>
+            <a:off x="4257783" y="2343848"/>
+            <a:ext cx="458780" cy="246221"/>
+          </a:xfrm>
+          <a:prstGeom prst="rect">
+            <a:avLst/>
+          </a:prstGeom>
+          <a:noFill/>
+        </p:spPr>
+        <p:txBody>
+          <a:bodyPr wrap="none" rtlCol="0">
+            <a:spAutoFit/>
+          </a:bodyPr>
+          <a:lstStyle/>
+          <a:p>
+            <a:r>
+              <a:rPr lang="en-US" sz="1000" dirty="0"/>
+              <a:t>[0..*]</a:t>
+            </a:r>
+          </a:p>
+        </p:txBody>
+      </p:sp>
+      <p:sp>
+        <p:nvSpPr>
+          <p:cNvPr id="66" name="TextBox 65">
+            <a:extLst>
+              <a:ext uri="{FF2B5EF4-FFF2-40B4-BE49-F238E27FC236}">
+                <a16:creationId xmlns:a16="http://schemas.microsoft.com/office/drawing/2014/main" id="{93D34439-5889-431D-9466-FBD42BF31708}"/>
+              </a:ext>
+            </a:extLst>
+          </p:cNvPr>
+          <p:cNvSpPr txBox="1"/>
+          <p:nvPr/>
+        </p:nvSpPr>
+        <p:spPr>
+          <a:xfrm>
+            <a:off x="8059157" y="3617072"/>
+            <a:ext cx="458780" cy="246221"/>
+          </a:xfrm>
+          <a:prstGeom prst="rect">
+            <a:avLst/>
+          </a:prstGeom>
+          <a:noFill/>
+        </p:spPr>
+        <p:txBody>
+          <a:bodyPr wrap="none" rtlCol="0">
+            <a:spAutoFit/>
+          </a:bodyPr>
+          <a:lstStyle/>
+          <a:p>
+            <a:r>
+              <a:rPr lang="en-US" sz="1000" dirty="0"/>
+              <a:t>[0..*]</a:t>
+            </a:r>
+          </a:p>
+        </p:txBody>
+      </p:sp>
+      <p:sp>
+        <p:nvSpPr>
+          <p:cNvPr id="68" name="TextBox 67">
+            <a:extLst>
+              <a:ext uri="{FF2B5EF4-FFF2-40B4-BE49-F238E27FC236}">
+                <a16:creationId xmlns:a16="http://schemas.microsoft.com/office/drawing/2014/main" id="{A94598DA-CC16-4358-8D83-6F533BB4F20F}"/>
+              </a:ext>
+            </a:extLst>
+          </p:cNvPr>
+          <p:cNvSpPr txBox="1"/>
+          <p:nvPr/>
+        </p:nvSpPr>
+        <p:spPr>
+          <a:xfrm>
+            <a:off x="8059157" y="4452958"/>
+            <a:ext cx="458780" cy="246221"/>
+          </a:xfrm>
+          <a:prstGeom prst="rect">
+            <a:avLst/>
+          </a:prstGeom>
+          <a:noFill/>
+        </p:spPr>
+        <p:txBody>
+          <a:bodyPr wrap="none" rtlCol="0">
+            <a:spAutoFit/>
+          </a:bodyPr>
+          <a:lstStyle/>
+          <a:p>
+            <a:r>
+              <a:rPr lang="en-US" sz="1000" dirty="0"/>
+              <a:t>[0..*]</a:t>
+            </a:r>
+          </a:p>
+        </p:txBody>
+      </p:sp>
+      <p:sp>
+        <p:nvSpPr>
+          <p:cNvPr id="70" name="TextBox 69">
+            <a:extLst>
+              <a:ext uri="{FF2B5EF4-FFF2-40B4-BE49-F238E27FC236}">
+                <a16:creationId xmlns:a16="http://schemas.microsoft.com/office/drawing/2014/main" id="{28F54F19-6277-4A57-84D2-00165D7E06DF}"/>
+              </a:ext>
+            </a:extLst>
+          </p:cNvPr>
+          <p:cNvSpPr txBox="1"/>
+          <p:nvPr/>
+        </p:nvSpPr>
+        <p:spPr>
+          <a:xfrm>
+            <a:off x="5460381" y="4428150"/>
+            <a:ext cx="458780" cy="246221"/>
+          </a:xfrm>
+          <a:prstGeom prst="rect">
+            <a:avLst/>
+          </a:prstGeom>
+          <a:noFill/>
+        </p:spPr>
+        <p:txBody>
+          <a:bodyPr wrap="none" rtlCol="0">
+            <a:spAutoFit/>
+          </a:bodyPr>
+          <a:lstStyle/>
+          <a:p>
+            <a:r>
+              <a:rPr lang="en-US" sz="1000" dirty="0"/>
+              <a:t>[0..*]</a:t>
+            </a:r>
+          </a:p>
+        </p:txBody>
+      </p:sp>
+      <p:sp>
+        <p:nvSpPr>
+          <p:cNvPr id="71" name="TextBox 70">
+            <a:extLst>
+              <a:ext uri="{FF2B5EF4-FFF2-40B4-BE49-F238E27FC236}">
+                <a16:creationId xmlns:a16="http://schemas.microsoft.com/office/drawing/2014/main" id="{4F171EEF-B72A-4C2E-96D0-BA6C58351101}"/>
+              </a:ext>
+            </a:extLst>
+          </p:cNvPr>
+          <p:cNvSpPr txBox="1"/>
+          <p:nvPr/>
+        </p:nvSpPr>
+        <p:spPr>
+          <a:xfrm>
+            <a:off x="5436119" y="3617072"/>
+            <a:ext cx="458780" cy="246221"/>
+          </a:xfrm>
+          <a:prstGeom prst="rect">
+            <a:avLst/>
+          </a:prstGeom>
+          <a:noFill/>
+        </p:spPr>
+        <p:txBody>
+          <a:bodyPr wrap="none" rtlCol="0">
+            <a:spAutoFit/>
+          </a:bodyPr>
+          <a:lstStyle/>
+          <a:p>
+            <a:r>
+              <a:rPr lang="en-US" sz="1000" dirty="0"/>
+              <a:t>[0..*]</a:t>
+            </a:r>
+          </a:p>
+        </p:txBody>
+      </p:sp>
+      <p:sp>
+        <p:nvSpPr>
+          <p:cNvPr id="72" name="TextBox 71">
+            <a:extLst>
+              <a:ext uri="{FF2B5EF4-FFF2-40B4-BE49-F238E27FC236}">
+                <a16:creationId xmlns:a16="http://schemas.microsoft.com/office/drawing/2014/main" id="{A762DFE3-1E49-452B-B1B8-1E6A2D00E428}"/>
+              </a:ext>
+            </a:extLst>
+          </p:cNvPr>
+          <p:cNvSpPr txBox="1"/>
+          <p:nvPr/>
+        </p:nvSpPr>
+        <p:spPr>
+          <a:xfrm>
+            <a:off x="5448376" y="2620932"/>
+            <a:ext cx="458780" cy="246221"/>
+          </a:xfrm>
+          <a:prstGeom prst="rect">
+            <a:avLst/>
+          </a:prstGeom>
+          <a:noFill/>
+        </p:spPr>
+        <p:txBody>
+          <a:bodyPr wrap="none" rtlCol="0">
+            <a:spAutoFit/>
+          </a:bodyPr>
+          <a:lstStyle/>
+          <a:p>
+            <a:r>
+              <a:rPr lang="en-US" sz="1000" dirty="0"/>
+              <a:t>[0..*]</a:t>
+            </a:r>
+          </a:p>
+        </p:txBody>
+      </p:sp>
+      <p:sp>
+        <p:nvSpPr>
+          <p:cNvPr id="76" name="TextBox 75">
+            <a:extLst>
+              <a:ext uri="{FF2B5EF4-FFF2-40B4-BE49-F238E27FC236}">
+                <a16:creationId xmlns:a16="http://schemas.microsoft.com/office/drawing/2014/main" id="{E35D292E-4EE4-41E8-85F7-16E2B787886B}"/>
+              </a:ext>
+            </a:extLst>
+          </p:cNvPr>
+          <p:cNvSpPr txBox="1"/>
+          <p:nvPr/>
+        </p:nvSpPr>
+        <p:spPr>
+          <a:xfrm>
+            <a:off x="6180928" y="5888253"/>
+            <a:ext cx="458780" cy="246221"/>
+          </a:xfrm>
+          <a:prstGeom prst="rect">
+            <a:avLst/>
+          </a:prstGeom>
+          <a:noFill/>
+        </p:spPr>
+        <p:txBody>
+          <a:bodyPr wrap="none" rtlCol="0">
+            <a:spAutoFit/>
+          </a:bodyPr>
+          <a:lstStyle/>
+          <a:p>
+            <a:r>
+              <a:rPr lang="en-US" sz="1000" dirty="0"/>
+              <a:t>[0..*]</a:t>
+            </a:r>
+          </a:p>
+        </p:txBody>
+      </p:sp>
+      <p:sp>
+        <p:nvSpPr>
+          <p:cNvPr id="81" name="TextBox 80">
+            <a:extLst>
+              <a:ext uri="{FF2B5EF4-FFF2-40B4-BE49-F238E27FC236}">
+                <a16:creationId xmlns:a16="http://schemas.microsoft.com/office/drawing/2014/main" id="{4BB751E8-EC96-4AC8-B9F7-DB676BACACDB}"/>
+              </a:ext>
+            </a:extLst>
+          </p:cNvPr>
+          <p:cNvSpPr txBox="1"/>
+          <p:nvPr/>
+        </p:nvSpPr>
+        <p:spPr>
+          <a:xfrm>
+            <a:off x="4038600" y="2110638"/>
+            <a:ext cx="458780" cy="246221"/>
+          </a:xfrm>
+          <a:prstGeom prst="rect">
+            <a:avLst/>
+          </a:prstGeom>
+          <a:noFill/>
+        </p:spPr>
+        <p:txBody>
+          <a:bodyPr wrap="none" rtlCol="0">
+            <a:spAutoFit/>
+          </a:bodyPr>
+          <a:lstStyle/>
+          <a:p>
+            <a:r>
+              <a:rPr lang="en-US" sz="1000" dirty="0">
+                <a:solidFill>
+                  <a:schemeClr val="accent2"/>
+                </a:solidFill>
+              </a:rPr>
+              <a:t>[0..*]</a:t>
+            </a:r>
+          </a:p>
+        </p:txBody>
+      </p:sp>
+      <p:sp>
+        <p:nvSpPr>
+          <p:cNvPr id="82" name="TextBox 81">
+            <a:extLst>
+              <a:ext uri="{FF2B5EF4-FFF2-40B4-BE49-F238E27FC236}">
+                <a16:creationId xmlns:a16="http://schemas.microsoft.com/office/drawing/2014/main" id="{5EB5D322-F4F5-4A05-960D-FDF35A74DAF2}"/>
+              </a:ext>
+            </a:extLst>
+          </p:cNvPr>
+          <p:cNvSpPr txBox="1"/>
+          <p:nvPr/>
+        </p:nvSpPr>
+        <p:spPr>
+          <a:xfrm>
+            <a:off x="4950607" y="1845494"/>
+            <a:ext cx="460382" cy="246221"/>
+          </a:xfrm>
+          <a:prstGeom prst="rect">
+            <a:avLst/>
+          </a:prstGeom>
+          <a:noFill/>
+        </p:spPr>
+        <p:txBody>
+          <a:bodyPr wrap="none" rtlCol="0">
+            <a:spAutoFit/>
+          </a:bodyPr>
+          <a:lstStyle/>
+          <a:p>
+            <a:r>
+              <a:rPr lang="en-US" sz="1000" dirty="0">
+                <a:solidFill>
+                  <a:schemeClr val="accent2"/>
+                </a:solidFill>
+              </a:rPr>
+              <a:t>[0..1]</a:t>
+            </a:r>
+          </a:p>
+        </p:txBody>
+      </p:sp>
+      <p:grpSp>
+        <p:nvGrpSpPr>
+          <p:cNvPr id="84" name="Group 83">
+            <a:extLst>
+              <a:ext uri="{FF2B5EF4-FFF2-40B4-BE49-F238E27FC236}">
+                <a16:creationId xmlns:a16="http://schemas.microsoft.com/office/drawing/2014/main" id="{CF1CE0C2-FF1A-40CD-8139-56CB68750038}"/>
+              </a:ext>
+            </a:extLst>
+          </p:cNvPr>
+          <p:cNvGrpSpPr/>
+          <p:nvPr/>
+        </p:nvGrpSpPr>
+        <p:grpSpPr>
+          <a:xfrm>
+            <a:off x="3200400" y="3091514"/>
+            <a:ext cx="1524000" cy="576596"/>
+            <a:chOff x="1219200" y="1219200"/>
+            <a:chExt cx="1524000" cy="957071"/>
+          </a:xfrm>
+        </p:grpSpPr>
+        <p:sp>
+          <p:nvSpPr>
+            <p:cNvPr id="86" name="Flowchart: Card 85">
+              <a:extLst>
+                <a:ext uri="{FF2B5EF4-FFF2-40B4-BE49-F238E27FC236}">
+                  <a16:creationId xmlns:a16="http://schemas.microsoft.com/office/drawing/2014/main" id="{B07DDA8E-A5C8-478F-BBC0-0752D9E35F20}"/>
+                </a:ext>
+              </a:extLst>
+            </p:cNvPr>
+            <p:cNvSpPr/>
+            <p:nvPr/>
+          </p:nvSpPr>
+          <p:spPr>
+            <a:xfrm>
+              <a:off x="1219200" y="1219200"/>
+              <a:ext cx="1371600" cy="804672"/>
+            </a:xfrm>
+            <a:prstGeom prst="flowChartPunchedCard">
+              <a:avLst/>
+            </a:prstGeom>
+            <a:solidFill>
+              <a:schemeClr val="bg1"/>
+            </a:solidFill>
+            <a:ln>
+              <a:solidFill>
+                <a:schemeClr val="tx1"/>
+              </a:solidFill>
+            </a:ln>
+          </p:spPr>
+          <p:style>
+            <a:lnRef idx="2">
+              <a:schemeClr val="accent1">
+                <a:shade val="50000"/>
+              </a:schemeClr>
+            </a:lnRef>
+            <a:fillRef idx="1">
+              <a:schemeClr val="accent1"/>
+            </a:fillRef>
+            <a:effectRef idx="0">
+              <a:schemeClr val="accent1"/>
+            </a:effectRef>
+            <a:fontRef idx="minor">
+              <a:schemeClr val="lt1"/>
+            </a:fontRef>
+          </p:style>
+          <p:txBody>
+            <a:bodyPr rtlCol="0" anchor="ctr"/>
+            <a:lstStyle/>
+            <a:p>
+              <a:pPr algn="ctr"/>
+              <a:endParaRPr lang="en-US" dirty="0">
+                <a:solidFill>
+                  <a:schemeClr val="tx1"/>
+                </a:solidFill>
+              </a:endParaRPr>
+            </a:p>
+          </p:txBody>
+        </p:sp>
+        <p:sp>
+          <p:nvSpPr>
+            <p:cNvPr id="87" name="Flowchart: Card 86">
+              <a:extLst>
+                <a:ext uri="{FF2B5EF4-FFF2-40B4-BE49-F238E27FC236}">
+                  <a16:creationId xmlns:a16="http://schemas.microsoft.com/office/drawing/2014/main" id="{BF34B5FF-9027-46C8-B7A2-4D24E13D237A}"/>
+                </a:ext>
+              </a:extLst>
+            </p:cNvPr>
+            <p:cNvSpPr/>
+            <p:nvPr/>
+          </p:nvSpPr>
+          <p:spPr>
+            <a:xfrm>
+              <a:off x="1295400" y="1295400"/>
+              <a:ext cx="1371600" cy="804672"/>
+            </a:xfrm>
+            <a:prstGeom prst="flowChartPunchedCard">
+              <a:avLst/>
+            </a:prstGeom>
+            <a:solidFill>
+              <a:schemeClr val="bg1"/>
+            </a:solidFill>
+            <a:ln>
+              <a:solidFill>
+                <a:schemeClr val="tx1"/>
+              </a:solidFill>
+            </a:ln>
+          </p:spPr>
+          <p:style>
+            <a:lnRef idx="2">
+              <a:schemeClr val="accent1">
+                <a:shade val="50000"/>
+              </a:schemeClr>
+            </a:lnRef>
+            <a:fillRef idx="1">
+              <a:schemeClr val="accent1"/>
+            </a:fillRef>
+            <a:effectRef idx="0">
+              <a:schemeClr val="accent1"/>
+            </a:effectRef>
+            <a:fontRef idx="minor">
+              <a:schemeClr val="lt1"/>
+            </a:fontRef>
+          </p:style>
+          <p:txBody>
+            <a:bodyPr rtlCol="0" anchor="ctr"/>
+            <a:lstStyle/>
+            <a:p>
+              <a:pPr algn="ctr"/>
+              <a:endParaRPr lang="en-US" dirty="0">
+                <a:solidFill>
+                  <a:schemeClr val="tx1"/>
+                </a:solidFill>
+              </a:endParaRPr>
+            </a:p>
+          </p:txBody>
+        </p:sp>
+        <p:sp>
+          <p:nvSpPr>
+            <p:cNvPr id="88" name="Flowchart: Card 87">
+              <a:extLst>
+                <a:ext uri="{FF2B5EF4-FFF2-40B4-BE49-F238E27FC236}">
+                  <a16:creationId xmlns:a16="http://schemas.microsoft.com/office/drawing/2014/main" id="{A6F7FE68-03E4-4BC4-B74F-3B5D7C807AFE}"/>
+                </a:ext>
+              </a:extLst>
+            </p:cNvPr>
+            <p:cNvSpPr/>
+            <p:nvPr/>
+          </p:nvSpPr>
+          <p:spPr>
+            <a:xfrm>
+              <a:off x="1371600" y="1371600"/>
+              <a:ext cx="1371600" cy="804671"/>
+            </a:xfrm>
+            <a:prstGeom prst="flowChartPunchedCard">
+              <a:avLst/>
+            </a:prstGeom>
+            <a:solidFill>
+              <a:schemeClr val="bg1"/>
+            </a:solidFill>
+            <a:ln>
+              <a:solidFill>
+                <a:schemeClr val="tx1"/>
+              </a:solidFill>
+            </a:ln>
+          </p:spPr>
+          <p:style>
+            <a:lnRef idx="2">
+              <a:schemeClr val="accent1">
+                <a:shade val="50000"/>
+              </a:schemeClr>
+            </a:lnRef>
+            <a:fillRef idx="1">
+              <a:schemeClr val="accent1"/>
+            </a:fillRef>
+            <a:effectRef idx="0">
+              <a:schemeClr val="accent1"/>
+            </a:effectRef>
+            <a:fontRef idx="minor">
+              <a:schemeClr val="lt1"/>
+            </a:fontRef>
+          </p:style>
+          <p:txBody>
+            <a:bodyPr rtlCol="0" anchor="ctr"/>
+            <a:lstStyle/>
+            <a:p>
+              <a:pPr algn="ctr"/>
+              <a:r>
+                <a:rPr lang="en-US" dirty="0">
+                  <a:solidFill>
+                    <a:schemeClr val="tx1"/>
+                  </a:solidFill>
+                </a:rPr>
+                <a:t>Jurisdiction</a:t>
+              </a:r>
+            </a:p>
+          </p:txBody>
+        </p:sp>
+      </p:grpSp>
+      <p:cxnSp>
+        <p:nvCxnSpPr>
+          <p:cNvPr id="12" name="Connector: Elbow 11">
+            <a:extLst>
+              <a:ext uri="{FF2B5EF4-FFF2-40B4-BE49-F238E27FC236}">
+                <a16:creationId xmlns:a16="http://schemas.microsoft.com/office/drawing/2014/main" id="{4CD08DFA-EB17-4896-9644-D9ED039F409D}"/>
+              </a:ext>
+            </a:extLst>
+          </p:cNvPr>
+          <p:cNvCxnSpPr>
+            <a:cxnSpLocks/>
+            <a:stCxn id="24" idx="1"/>
+            <a:endCxn id="88" idx="2"/>
+          </p:cNvCxnSpPr>
+          <p:nvPr/>
+        </p:nvCxnSpPr>
+        <p:spPr>
+          <a:xfrm rot="10800000">
+            <a:off x="4038602" y="3668110"/>
+            <a:ext cx="762789" cy="526444"/>
+          </a:xfrm>
+          <a:prstGeom prst="bentConnector2">
+            <a:avLst/>
+          </a:prstGeom>
+          <a:ln>
+            <a:solidFill>
+              <a:schemeClr val="tx1"/>
+            </a:solidFill>
+            <a:tailEnd type="arrow"/>
+          </a:ln>
+        </p:spPr>
+        <p:style>
+          <a:lnRef idx="1">
+            <a:schemeClr val="accent1"/>
+          </a:lnRef>
+          <a:fillRef idx="0">
+            <a:schemeClr val="accent1"/>
+          </a:fillRef>
+          <a:effectRef idx="0">
+            <a:schemeClr val="accent1"/>
+          </a:effectRef>
+          <a:fontRef idx="minor">
+            <a:schemeClr val="tx1"/>
+          </a:fontRef>
+        </p:style>
+      </p:cxnSp>
+      <p:sp>
+        <p:nvSpPr>
+          <p:cNvPr id="89" name="TextBox 88">
+            <a:extLst>
+              <a:ext uri="{FF2B5EF4-FFF2-40B4-BE49-F238E27FC236}">
+                <a16:creationId xmlns:a16="http://schemas.microsoft.com/office/drawing/2014/main" id="{6F072B95-595B-4ACB-8CA2-BEE3A93899D5}"/>
+              </a:ext>
+            </a:extLst>
+          </p:cNvPr>
+          <p:cNvSpPr txBox="1"/>
+          <p:nvPr/>
+        </p:nvSpPr>
+        <p:spPr>
+          <a:xfrm>
+            <a:off x="3978042" y="3996600"/>
+            <a:ext cx="535724" cy="246221"/>
+          </a:xfrm>
+          <a:prstGeom prst="rect">
+            <a:avLst/>
+          </a:prstGeom>
+          <a:noFill/>
+        </p:spPr>
+        <p:txBody>
+          <a:bodyPr wrap="none" rtlCol="0">
+            <a:spAutoFit/>
+          </a:bodyPr>
+          <a:lstStyle/>
+          <a:p>
+            <a:r>
+              <a:rPr lang="en-US" sz="1000" dirty="0"/>
+              <a:t>part of</a:t>
+            </a:r>
+          </a:p>
+        </p:txBody>
+      </p:sp>
+      <p:sp>
+        <p:nvSpPr>
+          <p:cNvPr id="92" name="TextBox 91">
+            <a:extLst>
+              <a:ext uri="{FF2B5EF4-FFF2-40B4-BE49-F238E27FC236}">
+                <a16:creationId xmlns:a16="http://schemas.microsoft.com/office/drawing/2014/main" id="{D7150973-2771-47C6-BDEA-C8DB8CCF04EE}"/>
+              </a:ext>
+            </a:extLst>
+          </p:cNvPr>
+          <p:cNvSpPr txBox="1"/>
+          <p:nvPr/>
+        </p:nvSpPr>
+        <p:spPr>
+          <a:xfrm>
+            <a:off x="4245904" y="4162283"/>
+            <a:ext cx="460382" cy="246221"/>
+          </a:xfrm>
+          <a:prstGeom prst="rect">
+            <a:avLst/>
+          </a:prstGeom>
+          <a:noFill/>
+        </p:spPr>
+        <p:txBody>
+          <a:bodyPr wrap="none" rtlCol="0">
+            <a:spAutoFit/>
+          </a:bodyPr>
+          <a:lstStyle/>
+          <a:p>
+            <a:r>
+              <a:rPr lang="en-US" sz="1000" dirty="0"/>
+              <a:t>[0..1]</a:t>
+            </a:r>
+          </a:p>
+        </p:txBody>
+      </p:sp>
+      <p:sp>
+        <p:nvSpPr>
+          <p:cNvPr id="93" name="TextBox 92">
+            <a:extLst>
+              <a:ext uri="{FF2B5EF4-FFF2-40B4-BE49-F238E27FC236}">
+                <a16:creationId xmlns:a16="http://schemas.microsoft.com/office/drawing/2014/main" id="{9BB13F3D-66C1-4CDB-A827-F03C56A7207C}"/>
+              </a:ext>
+            </a:extLst>
+          </p:cNvPr>
+          <p:cNvSpPr txBox="1"/>
+          <p:nvPr/>
+        </p:nvSpPr>
+        <p:spPr>
+          <a:xfrm>
+            <a:off x="3630281" y="3641120"/>
+            <a:ext cx="458780" cy="246221"/>
+          </a:xfrm>
+          <a:prstGeom prst="rect">
+            <a:avLst/>
+          </a:prstGeom>
+          <a:noFill/>
+        </p:spPr>
+        <p:txBody>
+          <a:bodyPr wrap="none" rtlCol="0">
+            <a:spAutoFit/>
+          </a:bodyPr>
+          <a:lstStyle/>
+          <a:p>
+            <a:r>
+              <a:rPr lang="en-US" sz="1000" dirty="0"/>
+              <a:t>[0..*]</a:t>
+            </a:r>
+          </a:p>
+        </p:txBody>
+      </p:sp>
+      <p:cxnSp>
+        <p:nvCxnSpPr>
+          <p:cNvPr id="94" name="Elbow Connector 13">
+            <a:extLst>
+              <a:ext uri="{FF2B5EF4-FFF2-40B4-BE49-F238E27FC236}">
+                <a16:creationId xmlns:a16="http://schemas.microsoft.com/office/drawing/2014/main" id="{2829575F-E68A-434F-8793-81E79DBC42D0}"/>
+              </a:ext>
+            </a:extLst>
+          </p:cNvPr>
+          <p:cNvCxnSpPr>
+            <a:cxnSpLocks/>
+            <a:stCxn id="86" idx="0"/>
+            <a:endCxn id="86" idx="1"/>
+          </p:cNvCxnSpPr>
+          <p:nvPr/>
+        </p:nvCxnSpPr>
+        <p:spPr>
+          <a:xfrm rot="16200000" flipH="1" flipV="1">
+            <a:off x="3422105" y="2869809"/>
+            <a:ext cx="242391" cy="685800"/>
+          </a:xfrm>
+          <a:prstGeom prst="bentConnector4">
+            <a:avLst>
+              <a:gd name="adj1" fmla="val -123833"/>
+              <a:gd name="adj2" fmla="val 134492"/>
+            </a:avLst>
+          </a:prstGeom>
+          <a:ln>
+            <a:solidFill>
+              <a:schemeClr val="accent2"/>
+            </a:solidFill>
+            <a:tailEnd type="arrow"/>
+          </a:ln>
+        </p:spPr>
+        <p:style>
+          <a:lnRef idx="1">
+            <a:schemeClr val="accent1"/>
+          </a:lnRef>
+          <a:fillRef idx="0">
+            <a:schemeClr val="accent1"/>
+          </a:fillRef>
+          <a:effectRef idx="0">
+            <a:schemeClr val="accent1"/>
+          </a:effectRef>
+          <a:fontRef idx="minor">
+            <a:schemeClr val="tx1"/>
+          </a:fontRef>
+        </p:style>
+      </p:cxnSp>
+      <p:sp>
+        <p:nvSpPr>
+          <p:cNvPr id="95" name="TextBox 94">
+            <a:extLst>
+              <a:ext uri="{FF2B5EF4-FFF2-40B4-BE49-F238E27FC236}">
+                <a16:creationId xmlns:a16="http://schemas.microsoft.com/office/drawing/2014/main" id="{01ED52DA-58F7-442D-9D67-5DD03F3F3D90}"/>
+              </a:ext>
+            </a:extLst>
+          </p:cNvPr>
+          <p:cNvSpPr txBox="1"/>
+          <p:nvPr/>
+        </p:nvSpPr>
+        <p:spPr>
+          <a:xfrm>
+            <a:off x="2971800" y="2566047"/>
+            <a:ext cx="535724" cy="246221"/>
+          </a:xfrm>
+          <a:prstGeom prst="rect">
+            <a:avLst/>
+          </a:prstGeom>
+          <a:noFill/>
+        </p:spPr>
+        <p:txBody>
+          <a:bodyPr wrap="none" rtlCol="0">
+            <a:spAutoFit/>
+          </a:bodyPr>
+          <a:lstStyle/>
+          <a:p>
+            <a:r>
+              <a:rPr lang="en-US" sz="1000" dirty="0">
+                <a:solidFill>
+                  <a:schemeClr val="accent2"/>
+                </a:solidFill>
+              </a:rPr>
+              <a:t>part of</a:t>
+            </a:r>
+          </a:p>
+        </p:txBody>
+      </p:sp>
+      <p:sp>
+        <p:nvSpPr>
+          <p:cNvPr id="96" name="TextBox 95">
+            <a:extLst>
+              <a:ext uri="{FF2B5EF4-FFF2-40B4-BE49-F238E27FC236}">
+                <a16:creationId xmlns:a16="http://schemas.microsoft.com/office/drawing/2014/main" id="{27B48D9C-E989-4B97-A99B-5ABCF8403272}"/>
+              </a:ext>
+            </a:extLst>
+          </p:cNvPr>
+          <p:cNvSpPr txBox="1"/>
+          <p:nvPr/>
+        </p:nvSpPr>
+        <p:spPr>
+          <a:xfrm>
+            <a:off x="2589220" y="3142251"/>
+            <a:ext cx="458780" cy="246221"/>
+          </a:xfrm>
+          <a:prstGeom prst="rect">
+            <a:avLst/>
+          </a:prstGeom>
+          <a:noFill/>
+        </p:spPr>
+        <p:txBody>
+          <a:bodyPr wrap="none" rtlCol="0">
+            <a:spAutoFit/>
+          </a:bodyPr>
+          <a:lstStyle/>
+          <a:p>
+            <a:r>
+              <a:rPr lang="en-US" sz="1000" dirty="0">
+                <a:solidFill>
+                  <a:schemeClr val="accent2"/>
+                </a:solidFill>
+              </a:rPr>
+              <a:t>[0..*]</a:t>
+            </a:r>
+          </a:p>
+        </p:txBody>
+      </p:sp>
+      <p:sp>
+        <p:nvSpPr>
+          <p:cNvPr id="97" name="TextBox 96">
+            <a:extLst>
+              <a:ext uri="{FF2B5EF4-FFF2-40B4-BE49-F238E27FC236}">
+                <a16:creationId xmlns:a16="http://schemas.microsoft.com/office/drawing/2014/main" id="{BDE1C20B-74CA-4E1D-9D53-6A5D08ADD298}"/>
+              </a:ext>
+            </a:extLst>
+          </p:cNvPr>
+          <p:cNvSpPr txBox="1"/>
+          <p:nvPr/>
+        </p:nvSpPr>
+        <p:spPr>
+          <a:xfrm>
+            <a:off x="3505200" y="2855072"/>
+            <a:ext cx="460382" cy="246221"/>
+          </a:xfrm>
+          <a:prstGeom prst="rect">
+            <a:avLst/>
+          </a:prstGeom>
+          <a:noFill/>
+        </p:spPr>
+        <p:txBody>
+          <a:bodyPr wrap="none" rtlCol="0">
+            <a:spAutoFit/>
+          </a:bodyPr>
+          <a:lstStyle/>
+          <a:p>
+            <a:r>
+              <a:rPr lang="en-US" sz="1000" dirty="0">
+                <a:solidFill>
+                  <a:schemeClr val="accent2"/>
+                </a:solidFill>
+              </a:rPr>
+              <a:t>[0..1]</a:t>
+            </a:r>
+          </a:p>
+        </p:txBody>
+      </p:sp>
+      <p:grpSp>
+        <p:nvGrpSpPr>
+          <p:cNvPr id="58" name="Group 57">
+            <a:extLst>
+              <a:ext uri="{FF2B5EF4-FFF2-40B4-BE49-F238E27FC236}">
+                <a16:creationId xmlns:a16="http://schemas.microsoft.com/office/drawing/2014/main" id="{BC2634BB-84F3-4A77-896E-F67158180D75}"/>
+              </a:ext>
+            </a:extLst>
+          </p:cNvPr>
+          <p:cNvGrpSpPr/>
+          <p:nvPr/>
+        </p:nvGrpSpPr>
+        <p:grpSpPr>
+          <a:xfrm>
+            <a:off x="6249848" y="4762538"/>
+            <a:ext cx="1524000" cy="576596"/>
+            <a:chOff x="1219200" y="1219200"/>
+            <a:chExt cx="1524000" cy="957071"/>
+          </a:xfrm>
+        </p:grpSpPr>
+        <p:sp>
+          <p:nvSpPr>
+            <p:cNvPr id="59" name="Flowchart: Card 58">
+              <a:extLst>
+                <a:ext uri="{FF2B5EF4-FFF2-40B4-BE49-F238E27FC236}">
+                  <a16:creationId xmlns:a16="http://schemas.microsoft.com/office/drawing/2014/main" id="{A49BDA26-3D42-484B-B1C0-FF6E97AE0BF9}"/>
+                </a:ext>
+              </a:extLst>
+            </p:cNvPr>
+            <p:cNvSpPr/>
+            <p:nvPr/>
+          </p:nvSpPr>
+          <p:spPr>
+            <a:xfrm>
+              <a:off x="1219200" y="1219200"/>
+              <a:ext cx="1371600" cy="804672"/>
+            </a:xfrm>
+            <a:prstGeom prst="flowChartPunchedCard">
+              <a:avLst/>
+            </a:prstGeom>
+            <a:solidFill>
+              <a:schemeClr val="bg1"/>
+            </a:solidFill>
+            <a:ln>
+              <a:solidFill>
+                <a:schemeClr val="tx1"/>
+              </a:solidFill>
+            </a:ln>
+          </p:spPr>
+          <p:style>
+            <a:lnRef idx="2">
+              <a:schemeClr val="accent1">
+                <a:shade val="50000"/>
+              </a:schemeClr>
+            </a:lnRef>
+            <a:fillRef idx="1">
+              <a:schemeClr val="accent1"/>
+            </a:fillRef>
+            <a:effectRef idx="0">
+              <a:schemeClr val="accent1"/>
+            </a:effectRef>
+            <a:fontRef idx="minor">
+              <a:schemeClr val="lt1"/>
+            </a:fontRef>
+          </p:style>
+          <p:txBody>
+            <a:bodyPr rtlCol="0" anchor="ctr"/>
+            <a:lstStyle/>
+            <a:p>
+              <a:pPr algn="ctr"/>
+              <a:endParaRPr lang="en-US" dirty="0">
+                <a:solidFill>
+                  <a:schemeClr val="tx1"/>
+                </a:solidFill>
+              </a:endParaRPr>
+            </a:p>
+          </p:txBody>
+        </p:sp>
+        <p:sp>
+          <p:nvSpPr>
+            <p:cNvPr id="60" name="Flowchart: Card 59">
+              <a:extLst>
+                <a:ext uri="{FF2B5EF4-FFF2-40B4-BE49-F238E27FC236}">
+                  <a16:creationId xmlns:a16="http://schemas.microsoft.com/office/drawing/2014/main" id="{A5592721-1A83-4C35-866C-42D88B81098E}"/>
+                </a:ext>
+              </a:extLst>
+            </p:cNvPr>
+            <p:cNvSpPr/>
+            <p:nvPr/>
+          </p:nvSpPr>
+          <p:spPr>
+            <a:xfrm>
+              <a:off x="1295400" y="1295400"/>
+              <a:ext cx="1371600" cy="804672"/>
+            </a:xfrm>
+            <a:prstGeom prst="flowChartPunchedCard">
+              <a:avLst/>
+            </a:prstGeom>
+            <a:solidFill>
+              <a:schemeClr val="bg1"/>
+            </a:solidFill>
+            <a:ln>
+              <a:solidFill>
+                <a:schemeClr val="tx1"/>
+              </a:solidFill>
+            </a:ln>
+          </p:spPr>
+          <p:style>
+            <a:lnRef idx="2">
+              <a:schemeClr val="accent1">
+                <a:shade val="50000"/>
+              </a:schemeClr>
+            </a:lnRef>
+            <a:fillRef idx="1">
+              <a:schemeClr val="accent1"/>
+            </a:fillRef>
+            <a:effectRef idx="0">
+              <a:schemeClr val="accent1"/>
+            </a:effectRef>
+            <a:fontRef idx="minor">
+              <a:schemeClr val="lt1"/>
+            </a:fontRef>
+          </p:style>
+          <p:txBody>
+            <a:bodyPr rtlCol="0" anchor="ctr"/>
+            <a:lstStyle/>
+            <a:p>
+              <a:pPr algn="ctr"/>
+              <a:endParaRPr lang="en-US" dirty="0">
+                <a:solidFill>
+                  <a:schemeClr val="tx1"/>
+                </a:solidFill>
+              </a:endParaRPr>
+            </a:p>
+          </p:txBody>
+        </p:sp>
+        <p:sp>
+          <p:nvSpPr>
+            <p:cNvPr id="61" name="Flowchart: Card 60">
+              <a:extLst>
+                <a:ext uri="{FF2B5EF4-FFF2-40B4-BE49-F238E27FC236}">
+                  <a16:creationId xmlns:a16="http://schemas.microsoft.com/office/drawing/2014/main" id="{7818A927-A17F-4519-9547-23E0DA1BC565}"/>
+                </a:ext>
+              </a:extLst>
+            </p:cNvPr>
+            <p:cNvSpPr/>
+            <p:nvPr/>
+          </p:nvSpPr>
+          <p:spPr>
+            <a:xfrm>
+              <a:off x="1371600" y="1371600"/>
+              <a:ext cx="1371600" cy="804671"/>
+            </a:xfrm>
+            <a:prstGeom prst="flowChartPunchedCard">
+              <a:avLst/>
+            </a:prstGeom>
+            <a:solidFill>
+              <a:schemeClr val="bg1"/>
+            </a:solidFill>
+            <a:ln>
+              <a:solidFill>
+                <a:schemeClr val="tx1"/>
+              </a:solidFill>
+            </a:ln>
+          </p:spPr>
+          <p:style>
+            <a:lnRef idx="2">
+              <a:schemeClr val="accent1">
+                <a:shade val="50000"/>
+              </a:schemeClr>
+            </a:lnRef>
+            <a:fillRef idx="1">
+              <a:schemeClr val="accent1"/>
+            </a:fillRef>
+            <a:effectRef idx="0">
+              <a:schemeClr val="accent1"/>
+            </a:effectRef>
+            <a:fontRef idx="minor">
+              <a:schemeClr val="lt1"/>
+            </a:fontRef>
+          </p:style>
+          <p:txBody>
+            <a:bodyPr rtlCol="0" anchor="ctr"/>
+            <a:lstStyle/>
+            <a:p>
+              <a:pPr algn="ctr"/>
+              <a:r>
+                <a:rPr lang="en-US" dirty="0">
+                  <a:solidFill>
+                    <a:schemeClr val="tx1"/>
+                  </a:solidFill>
+                </a:rPr>
+                <a:t>Location</a:t>
+              </a:r>
+            </a:p>
+          </p:txBody>
+        </p:sp>
+      </p:grpSp>
+      <p:cxnSp>
+        <p:nvCxnSpPr>
+          <p:cNvPr id="62" name="Elbow Connector 13">
+            <a:extLst>
+              <a:ext uri="{FF2B5EF4-FFF2-40B4-BE49-F238E27FC236}">
+                <a16:creationId xmlns:a16="http://schemas.microsoft.com/office/drawing/2014/main" id="{3FB47B8D-A63A-402A-845D-1D3DD6A148AC}"/>
+              </a:ext>
+            </a:extLst>
+          </p:cNvPr>
+          <p:cNvCxnSpPr>
+            <a:cxnSpLocks/>
+            <a:stCxn id="61" idx="2"/>
+            <a:endCxn id="61" idx="3"/>
+          </p:cNvCxnSpPr>
+          <p:nvPr/>
+        </p:nvCxnSpPr>
+        <p:spPr>
+          <a:xfrm rot="5400000" flipH="1" flipV="1">
+            <a:off x="7309753" y="4875039"/>
+            <a:ext cx="242390" cy="685800"/>
+          </a:xfrm>
+          <a:prstGeom prst="bentConnector4">
+            <a:avLst>
+              <a:gd name="adj1" fmla="val -94311"/>
+              <a:gd name="adj2" fmla="val 133333"/>
+            </a:avLst>
+          </a:prstGeom>
+          <a:ln>
+            <a:solidFill>
+              <a:schemeClr val="accent2"/>
+            </a:solidFill>
+            <a:tailEnd type="arrow"/>
+          </a:ln>
+        </p:spPr>
+        <p:style>
+          <a:lnRef idx="1">
+            <a:schemeClr val="accent1"/>
+          </a:lnRef>
+          <a:fillRef idx="0">
+            <a:schemeClr val="accent1"/>
+          </a:fillRef>
+          <a:effectRef idx="0">
+            <a:schemeClr val="accent1"/>
+          </a:effectRef>
+          <a:fontRef idx="minor">
+            <a:schemeClr val="tx1"/>
+          </a:fontRef>
+        </p:style>
+      </p:cxnSp>
+      <p:sp>
+        <p:nvSpPr>
+          <p:cNvPr id="63" name="TextBox 62">
+            <a:extLst>
+              <a:ext uri="{FF2B5EF4-FFF2-40B4-BE49-F238E27FC236}">
+                <a16:creationId xmlns:a16="http://schemas.microsoft.com/office/drawing/2014/main" id="{D5A16B4A-9893-40EA-92B6-4DD8D9BCE6F9}"/>
+              </a:ext>
+            </a:extLst>
+          </p:cNvPr>
+          <p:cNvSpPr txBox="1"/>
+          <p:nvPr/>
+        </p:nvSpPr>
+        <p:spPr>
+          <a:xfrm>
+            <a:off x="7496802" y="5495959"/>
+            <a:ext cx="535724" cy="246221"/>
+          </a:xfrm>
+          <a:prstGeom prst="rect">
+            <a:avLst/>
+          </a:prstGeom>
+          <a:noFill/>
+        </p:spPr>
+        <p:txBody>
+          <a:bodyPr wrap="none" rtlCol="0">
+            <a:spAutoFit/>
+          </a:bodyPr>
+          <a:lstStyle/>
+          <a:p>
+            <a:r>
+              <a:rPr lang="en-US" sz="1000" dirty="0">
+                <a:solidFill>
+                  <a:schemeClr val="accent2"/>
+                </a:solidFill>
+              </a:rPr>
+              <a:t>part of</a:t>
+            </a:r>
+          </a:p>
+        </p:txBody>
+      </p:sp>
+      <p:sp>
+        <p:nvSpPr>
+          <p:cNvPr id="64" name="TextBox 63">
+            <a:extLst>
+              <a:ext uri="{FF2B5EF4-FFF2-40B4-BE49-F238E27FC236}">
+                <a16:creationId xmlns:a16="http://schemas.microsoft.com/office/drawing/2014/main" id="{98B355B2-EA66-456E-BE40-52AC95D631FA}"/>
+              </a:ext>
+            </a:extLst>
+          </p:cNvPr>
+          <p:cNvSpPr txBox="1"/>
+          <p:nvPr/>
+        </p:nvSpPr>
+        <p:spPr>
+          <a:xfrm>
+            <a:off x="7951476" y="5034817"/>
+            <a:ext cx="458780" cy="246221"/>
+          </a:xfrm>
+          <a:prstGeom prst="rect">
+            <a:avLst/>
+          </a:prstGeom>
+          <a:noFill/>
+        </p:spPr>
+        <p:txBody>
+          <a:bodyPr wrap="none" rtlCol="0">
+            <a:spAutoFit/>
+          </a:bodyPr>
+          <a:lstStyle/>
+          <a:p>
+            <a:r>
+              <a:rPr lang="en-US" sz="1000" dirty="0">
+                <a:solidFill>
+                  <a:schemeClr val="accent2"/>
+                </a:solidFill>
+              </a:rPr>
+              <a:t>[0..*]</a:t>
+            </a:r>
+          </a:p>
+        </p:txBody>
+      </p:sp>
+      <p:sp>
+        <p:nvSpPr>
+          <p:cNvPr id="101" name="TextBox 100">
+            <a:extLst>
+              <a:ext uri="{FF2B5EF4-FFF2-40B4-BE49-F238E27FC236}">
+                <a16:creationId xmlns:a16="http://schemas.microsoft.com/office/drawing/2014/main" id="{9620A89E-92F9-4582-836D-A0C2D015ADA9}"/>
+              </a:ext>
+            </a:extLst>
+          </p:cNvPr>
+          <p:cNvSpPr txBox="1"/>
+          <p:nvPr/>
+        </p:nvSpPr>
+        <p:spPr>
+          <a:xfrm>
+            <a:off x="7036420" y="5293227"/>
+            <a:ext cx="460382" cy="246221"/>
+          </a:xfrm>
+          <a:prstGeom prst="rect">
+            <a:avLst/>
+          </a:prstGeom>
+          <a:noFill/>
+        </p:spPr>
+        <p:txBody>
+          <a:bodyPr wrap="none" rtlCol="0">
+            <a:spAutoFit/>
+          </a:bodyPr>
+          <a:lstStyle/>
+          <a:p>
+            <a:r>
+              <a:rPr lang="en-US" sz="1000" dirty="0">
+                <a:solidFill>
+                  <a:schemeClr val="accent2"/>
+                </a:solidFill>
+              </a:rPr>
+              <a:t>[0..1]</a:t>
+            </a:r>
+          </a:p>
+        </p:txBody>
+      </p:sp>
+      <p:sp>
+        <p:nvSpPr>
+          <p:cNvPr id="105" name="TextBox 104">
+            <a:extLst>
+              <a:ext uri="{FF2B5EF4-FFF2-40B4-BE49-F238E27FC236}">
+                <a16:creationId xmlns:a16="http://schemas.microsoft.com/office/drawing/2014/main" id="{15BB2C0A-7A2F-464D-B13B-A275CA4861F1}"/>
+              </a:ext>
+            </a:extLst>
+          </p:cNvPr>
+          <p:cNvSpPr txBox="1"/>
+          <p:nvPr/>
+        </p:nvSpPr>
+        <p:spPr>
+          <a:xfrm>
+            <a:off x="5935254" y="4456532"/>
+            <a:ext cx="458780" cy="246221"/>
+          </a:xfrm>
+          <a:prstGeom prst="rect">
+            <a:avLst/>
+          </a:prstGeom>
+          <a:noFill/>
+        </p:spPr>
+        <p:txBody>
+          <a:bodyPr wrap="none" rtlCol="0">
+            <a:spAutoFit/>
+          </a:bodyPr>
+          <a:lstStyle/>
+          <a:p>
+            <a:r>
+              <a:rPr lang="en-US" sz="1000" dirty="0"/>
+              <a:t>[0..*]</a:t>
+            </a:r>
+          </a:p>
+        </p:txBody>
+      </p:sp>
+      <p:cxnSp>
+        <p:nvCxnSpPr>
+          <p:cNvPr id="102" name="Connector: Elbow 101">
+            <a:extLst>
+              <a:ext uri="{FF2B5EF4-FFF2-40B4-BE49-F238E27FC236}">
+                <a16:creationId xmlns:a16="http://schemas.microsoft.com/office/drawing/2014/main" id="{8889E375-4DEF-402E-BDC2-3FD856591775}"/>
+              </a:ext>
+            </a:extLst>
+          </p:cNvPr>
+          <p:cNvCxnSpPr>
+            <a:cxnSpLocks/>
+            <a:stCxn id="61" idx="1"/>
+          </p:cNvCxnSpPr>
+          <p:nvPr/>
+        </p:nvCxnSpPr>
+        <p:spPr>
+          <a:xfrm rot="10800000">
+            <a:off x="5961030" y="4427536"/>
+            <a:ext cx="441219" cy="669208"/>
+          </a:xfrm>
+          <a:prstGeom prst="bentConnector2">
+            <a:avLst/>
+          </a:prstGeom>
+          <a:ln>
+            <a:solidFill>
+              <a:schemeClr val="tx1"/>
+            </a:solidFill>
+            <a:tailEnd type="arrow"/>
+          </a:ln>
+        </p:spPr>
+        <p:style>
+          <a:lnRef idx="1">
+            <a:schemeClr val="accent1"/>
+          </a:lnRef>
+          <a:fillRef idx="0">
+            <a:schemeClr val="accent1"/>
+          </a:fillRef>
+          <a:effectRef idx="0">
+            <a:schemeClr val="accent1"/>
+          </a:effectRef>
+          <a:fontRef idx="minor">
+            <a:schemeClr val="tx1"/>
+          </a:fontRef>
+        </p:style>
+      </p:cxnSp>
+      <p:sp>
+        <p:nvSpPr>
+          <p:cNvPr id="103" name="TextBox 102">
+            <a:extLst>
+              <a:ext uri="{FF2B5EF4-FFF2-40B4-BE49-F238E27FC236}">
+                <a16:creationId xmlns:a16="http://schemas.microsoft.com/office/drawing/2014/main" id="{667D19E3-304F-4C9A-8D46-89D182B60801}"/>
+              </a:ext>
+            </a:extLst>
+          </p:cNvPr>
+          <p:cNvSpPr txBox="1"/>
+          <p:nvPr/>
+        </p:nvSpPr>
+        <p:spPr>
+          <a:xfrm rot="16200000">
+            <a:off x="5620547" y="4784019"/>
+            <a:ext cx="535724" cy="246221"/>
+          </a:xfrm>
+          <a:prstGeom prst="rect">
+            <a:avLst/>
+          </a:prstGeom>
+          <a:noFill/>
+        </p:spPr>
+        <p:txBody>
+          <a:bodyPr wrap="none" rtlCol="0">
+            <a:spAutoFit/>
+          </a:bodyPr>
+          <a:lstStyle/>
+          <a:p>
+            <a:r>
+              <a:rPr lang="en-US" sz="1000" dirty="0"/>
+              <a:t>part of</a:t>
+            </a:r>
+          </a:p>
+        </p:txBody>
+      </p:sp>
+      <p:sp>
+        <p:nvSpPr>
+          <p:cNvPr id="104" name="TextBox 103">
+            <a:extLst>
+              <a:ext uri="{FF2B5EF4-FFF2-40B4-BE49-F238E27FC236}">
+                <a16:creationId xmlns:a16="http://schemas.microsoft.com/office/drawing/2014/main" id="{DB408537-B21F-456C-9683-4F50092CD0F2}"/>
+              </a:ext>
+            </a:extLst>
+          </p:cNvPr>
+          <p:cNvSpPr txBox="1"/>
+          <p:nvPr/>
+        </p:nvSpPr>
+        <p:spPr>
+          <a:xfrm>
+            <a:off x="5897744" y="5043012"/>
+            <a:ext cx="460382" cy="246221"/>
+          </a:xfrm>
+          <a:prstGeom prst="rect">
+            <a:avLst/>
+          </a:prstGeom>
+          <a:noFill/>
+        </p:spPr>
+        <p:txBody>
+          <a:bodyPr wrap="none" rtlCol="0">
+            <a:spAutoFit/>
+          </a:bodyPr>
+          <a:lstStyle/>
+          <a:p>
+            <a:r>
+              <a:rPr lang="en-US" sz="1000" dirty="0"/>
+              <a:t>[0..1]</a:t>
+            </a:r>
+          </a:p>
+        </p:txBody>
+      </p:sp>
+      <p:cxnSp>
+        <p:nvCxnSpPr>
+          <p:cNvPr id="107" name="Connector: Elbow 106">
+            <a:extLst>
+              <a:ext uri="{FF2B5EF4-FFF2-40B4-BE49-F238E27FC236}">
+                <a16:creationId xmlns:a16="http://schemas.microsoft.com/office/drawing/2014/main" id="{97F6F2F9-44AF-4BEF-ADC3-7A60442138DF}"/>
+              </a:ext>
+            </a:extLst>
+          </p:cNvPr>
+          <p:cNvCxnSpPr>
+            <a:cxnSpLocks/>
+            <a:stCxn id="32" idx="1"/>
+            <a:endCxn id="59" idx="0"/>
+          </p:cNvCxnSpPr>
+          <p:nvPr/>
+        </p:nvCxnSpPr>
+        <p:spPr>
+          <a:xfrm rot="10800000" flipV="1">
+            <a:off x="6935648" y="4211524"/>
+            <a:ext cx="836752" cy="551013"/>
+          </a:xfrm>
+          <a:prstGeom prst="bentConnector2">
+            <a:avLst/>
+          </a:prstGeom>
+          <a:ln>
+            <a:solidFill>
+              <a:schemeClr val="tx1"/>
+            </a:solidFill>
+            <a:tailEnd type="arrow"/>
+          </a:ln>
+        </p:spPr>
+        <p:style>
+          <a:lnRef idx="1">
+            <a:schemeClr val="accent1"/>
+          </a:lnRef>
+          <a:fillRef idx="0">
+            <a:schemeClr val="accent1"/>
+          </a:fillRef>
+          <a:effectRef idx="0">
+            <a:schemeClr val="accent1"/>
+          </a:effectRef>
+          <a:fontRef idx="minor">
+            <a:schemeClr val="tx1"/>
+          </a:fontRef>
+        </p:style>
+      </p:cxnSp>
+      <p:sp>
+        <p:nvSpPr>
+          <p:cNvPr id="108" name="TextBox 107">
+            <a:extLst>
+              <a:ext uri="{FF2B5EF4-FFF2-40B4-BE49-F238E27FC236}">
+                <a16:creationId xmlns:a16="http://schemas.microsoft.com/office/drawing/2014/main" id="{FE420CCA-8BF1-42C6-804C-278CCCDCBCC8}"/>
+              </a:ext>
+            </a:extLst>
+          </p:cNvPr>
+          <p:cNvSpPr txBox="1"/>
+          <p:nvPr/>
+        </p:nvSpPr>
+        <p:spPr>
+          <a:xfrm>
+            <a:off x="6879966" y="4499486"/>
+            <a:ext cx="458780" cy="246221"/>
+          </a:xfrm>
+          <a:prstGeom prst="rect">
+            <a:avLst/>
+          </a:prstGeom>
+          <a:noFill/>
+        </p:spPr>
+        <p:txBody>
+          <a:bodyPr wrap="none" rtlCol="0">
+            <a:spAutoFit/>
+          </a:bodyPr>
+          <a:lstStyle/>
+          <a:p>
+            <a:r>
+              <a:rPr lang="en-US" sz="1000" dirty="0"/>
+              <a:t>[0..*]</a:t>
+            </a:r>
+          </a:p>
+        </p:txBody>
+      </p:sp>
+      <p:grpSp>
+        <p:nvGrpSpPr>
+          <p:cNvPr id="74" name="Group 73">
+            <a:extLst>
+              <a:ext uri="{FF2B5EF4-FFF2-40B4-BE49-F238E27FC236}">
+                <a16:creationId xmlns:a16="http://schemas.microsoft.com/office/drawing/2014/main" id="{BD3C039F-4B56-4342-BABE-CB1E3DC540D4}"/>
+              </a:ext>
+            </a:extLst>
+          </p:cNvPr>
+          <p:cNvGrpSpPr/>
+          <p:nvPr/>
+        </p:nvGrpSpPr>
+        <p:grpSpPr>
+          <a:xfrm>
+            <a:off x="2514600" y="777283"/>
+            <a:ext cx="1524000" cy="576597"/>
+            <a:chOff x="1219200" y="1219200"/>
+            <a:chExt cx="1524000" cy="957073"/>
+          </a:xfrm>
+        </p:grpSpPr>
+        <p:sp>
+          <p:nvSpPr>
+            <p:cNvPr id="77" name="Flowchart: Card 76">
+              <a:extLst>
+                <a:ext uri="{FF2B5EF4-FFF2-40B4-BE49-F238E27FC236}">
+                  <a16:creationId xmlns:a16="http://schemas.microsoft.com/office/drawing/2014/main" id="{B443022E-8573-4597-A5EF-E7DE16B2388F}"/>
+                </a:ext>
+              </a:extLst>
+            </p:cNvPr>
+            <p:cNvSpPr/>
+            <p:nvPr/>
+          </p:nvSpPr>
+          <p:spPr>
+            <a:xfrm>
+              <a:off x="1219200" y="1219200"/>
+              <a:ext cx="1371600" cy="804672"/>
+            </a:xfrm>
+            <a:prstGeom prst="flowChartPunchedCard">
+              <a:avLst/>
+            </a:prstGeom>
+            <a:solidFill>
+              <a:schemeClr val="bg1"/>
+            </a:solidFill>
+            <a:ln>
+              <a:solidFill>
+                <a:schemeClr val="tx1"/>
+              </a:solidFill>
+            </a:ln>
+          </p:spPr>
+          <p:style>
+            <a:lnRef idx="2">
+              <a:schemeClr val="accent1">
+                <a:shade val="50000"/>
+              </a:schemeClr>
+            </a:lnRef>
+            <a:fillRef idx="1">
+              <a:schemeClr val="accent1"/>
+            </a:fillRef>
+            <a:effectRef idx="0">
+              <a:schemeClr val="accent1"/>
+            </a:effectRef>
+            <a:fontRef idx="minor">
+              <a:schemeClr val="lt1"/>
+            </a:fontRef>
+          </p:style>
+          <p:txBody>
+            <a:bodyPr rtlCol="0" anchor="ctr"/>
+            <a:lstStyle/>
+            <a:p>
+              <a:pPr algn="ctr"/>
+              <a:endParaRPr lang="en-US" dirty="0">
+                <a:solidFill>
+                  <a:schemeClr val="tx1"/>
+                </a:solidFill>
+              </a:endParaRPr>
+            </a:p>
+          </p:txBody>
+        </p:sp>
+        <p:sp>
+          <p:nvSpPr>
+            <p:cNvPr id="79" name="Flowchart: Card 78">
+              <a:extLst>
+                <a:ext uri="{FF2B5EF4-FFF2-40B4-BE49-F238E27FC236}">
+                  <a16:creationId xmlns:a16="http://schemas.microsoft.com/office/drawing/2014/main" id="{E2C25611-FF41-4EBA-B06E-74103D3955E7}"/>
+                </a:ext>
+              </a:extLst>
+            </p:cNvPr>
+            <p:cNvSpPr/>
+            <p:nvPr/>
+          </p:nvSpPr>
+          <p:spPr>
+            <a:xfrm>
+              <a:off x="1295400" y="1295400"/>
+              <a:ext cx="1371600" cy="804672"/>
+            </a:xfrm>
+            <a:prstGeom prst="flowChartPunchedCard">
+              <a:avLst/>
+            </a:prstGeom>
+            <a:solidFill>
+              <a:schemeClr val="bg1"/>
+            </a:solidFill>
+            <a:ln>
+              <a:solidFill>
+                <a:schemeClr val="tx1"/>
+              </a:solidFill>
+            </a:ln>
+          </p:spPr>
+          <p:style>
+            <a:lnRef idx="2">
+              <a:schemeClr val="accent1">
+                <a:shade val="50000"/>
+              </a:schemeClr>
+            </a:lnRef>
+            <a:fillRef idx="1">
+              <a:schemeClr val="accent1"/>
+            </a:fillRef>
+            <a:effectRef idx="0">
+              <a:schemeClr val="accent1"/>
+            </a:effectRef>
+            <a:fontRef idx="minor">
+              <a:schemeClr val="lt1"/>
+            </a:fontRef>
+          </p:style>
+          <p:txBody>
+            <a:bodyPr rtlCol="0" anchor="ctr"/>
+            <a:lstStyle/>
+            <a:p>
+              <a:pPr algn="ctr"/>
+              <a:endParaRPr lang="en-US" dirty="0">
+                <a:solidFill>
+                  <a:schemeClr val="tx1"/>
+                </a:solidFill>
+              </a:endParaRPr>
+            </a:p>
+          </p:txBody>
+        </p:sp>
+        <p:sp>
+          <p:nvSpPr>
+            <p:cNvPr id="91" name="Flowchart: Card 90">
+              <a:extLst>
+                <a:ext uri="{FF2B5EF4-FFF2-40B4-BE49-F238E27FC236}">
+                  <a16:creationId xmlns:a16="http://schemas.microsoft.com/office/drawing/2014/main" id="{6E425900-F882-4B17-9C75-2BF509999F20}"/>
+                </a:ext>
+              </a:extLst>
+            </p:cNvPr>
+            <p:cNvSpPr/>
+            <p:nvPr/>
+          </p:nvSpPr>
+          <p:spPr>
+            <a:xfrm>
+              <a:off x="1371600" y="1371602"/>
+              <a:ext cx="1371600" cy="804671"/>
+            </a:xfrm>
+            <a:prstGeom prst="flowChartPunchedCard">
+              <a:avLst/>
+            </a:prstGeom>
+            <a:solidFill>
+              <a:schemeClr val="bg1"/>
+            </a:solidFill>
+            <a:ln>
+              <a:solidFill>
+                <a:schemeClr val="tx1"/>
+              </a:solidFill>
+            </a:ln>
+          </p:spPr>
+          <p:style>
+            <a:lnRef idx="2">
+              <a:schemeClr val="accent1">
+                <a:shade val="50000"/>
+              </a:schemeClr>
+            </a:lnRef>
+            <a:fillRef idx="1">
+              <a:schemeClr val="accent1"/>
+            </a:fillRef>
+            <a:effectRef idx="0">
+              <a:schemeClr val="accent1"/>
+            </a:effectRef>
+            <a:fontRef idx="minor">
+              <a:schemeClr val="lt1"/>
+            </a:fontRef>
+          </p:style>
+          <p:txBody>
+            <a:bodyPr rtlCol="0" anchor="ctr"/>
+            <a:lstStyle/>
+            <a:p>
+              <a:pPr algn="ctr"/>
+              <a:r>
+                <a:rPr lang="en-US" dirty="0">
+                  <a:solidFill>
+                    <a:schemeClr val="tx1"/>
+                  </a:solidFill>
+                </a:rPr>
+                <a:t>Affiliation</a:t>
+              </a:r>
+            </a:p>
+          </p:txBody>
+        </p:sp>
+      </p:grpSp>
+      <p:grpSp>
+        <p:nvGrpSpPr>
+          <p:cNvPr id="99" name="Group 98">
+            <a:extLst>
+              <a:ext uri="{FF2B5EF4-FFF2-40B4-BE49-F238E27FC236}">
+                <a16:creationId xmlns:a16="http://schemas.microsoft.com/office/drawing/2014/main" id="{BB4D4C35-FAE8-4427-8681-975D10EDCBA8}"/>
+              </a:ext>
+            </a:extLst>
+          </p:cNvPr>
+          <p:cNvGrpSpPr/>
+          <p:nvPr/>
+        </p:nvGrpSpPr>
+        <p:grpSpPr>
+          <a:xfrm>
+            <a:off x="6704676" y="777283"/>
+            <a:ext cx="1524000" cy="576596"/>
+            <a:chOff x="1219200" y="1219200"/>
+            <a:chExt cx="1524000" cy="957071"/>
+          </a:xfrm>
+        </p:grpSpPr>
+        <p:sp>
+          <p:nvSpPr>
+            <p:cNvPr id="100" name="Flowchart: Card 99">
+              <a:extLst>
+                <a:ext uri="{FF2B5EF4-FFF2-40B4-BE49-F238E27FC236}">
+                  <a16:creationId xmlns:a16="http://schemas.microsoft.com/office/drawing/2014/main" id="{FA72B559-386E-4236-B008-B6ACF2D8C576}"/>
+                </a:ext>
+              </a:extLst>
+            </p:cNvPr>
+            <p:cNvSpPr/>
+            <p:nvPr/>
+          </p:nvSpPr>
+          <p:spPr>
+            <a:xfrm>
+              <a:off x="1219200" y="1219200"/>
+              <a:ext cx="1371600" cy="804672"/>
+            </a:xfrm>
+            <a:prstGeom prst="flowChartPunchedCard">
+              <a:avLst/>
+            </a:prstGeom>
+            <a:solidFill>
+              <a:schemeClr val="bg1"/>
+            </a:solidFill>
+            <a:ln>
+              <a:solidFill>
+                <a:schemeClr val="tx1"/>
+              </a:solidFill>
+            </a:ln>
+          </p:spPr>
+          <p:style>
+            <a:lnRef idx="2">
+              <a:schemeClr val="accent1">
+                <a:shade val="50000"/>
+              </a:schemeClr>
+            </a:lnRef>
+            <a:fillRef idx="1">
+              <a:schemeClr val="accent1"/>
+            </a:fillRef>
+            <a:effectRef idx="0">
+              <a:schemeClr val="accent1"/>
+            </a:effectRef>
+            <a:fontRef idx="minor">
+              <a:schemeClr val="lt1"/>
+            </a:fontRef>
+          </p:style>
+          <p:txBody>
+            <a:bodyPr rtlCol="0" anchor="ctr"/>
+            <a:lstStyle/>
+            <a:p>
+              <a:pPr algn="ctr"/>
+              <a:endParaRPr lang="en-US" dirty="0">
+                <a:solidFill>
+                  <a:schemeClr val="tx1"/>
+                </a:solidFill>
+              </a:endParaRPr>
+            </a:p>
+          </p:txBody>
+        </p:sp>
+        <p:sp>
+          <p:nvSpPr>
+            <p:cNvPr id="106" name="Flowchart: Card 105">
+              <a:extLst>
+                <a:ext uri="{FF2B5EF4-FFF2-40B4-BE49-F238E27FC236}">
+                  <a16:creationId xmlns:a16="http://schemas.microsoft.com/office/drawing/2014/main" id="{7F1D1116-3F7F-452D-804F-396FCF38BBE1}"/>
+                </a:ext>
+              </a:extLst>
+            </p:cNvPr>
+            <p:cNvSpPr/>
+            <p:nvPr/>
+          </p:nvSpPr>
+          <p:spPr>
+            <a:xfrm>
+              <a:off x="1295400" y="1295400"/>
+              <a:ext cx="1371600" cy="804672"/>
+            </a:xfrm>
+            <a:prstGeom prst="flowChartPunchedCard">
+              <a:avLst/>
+            </a:prstGeom>
+            <a:solidFill>
+              <a:schemeClr val="bg1"/>
+            </a:solidFill>
+            <a:ln>
+              <a:solidFill>
+                <a:schemeClr val="tx1"/>
+              </a:solidFill>
+            </a:ln>
+          </p:spPr>
+          <p:style>
+            <a:lnRef idx="2">
+              <a:schemeClr val="accent1">
+                <a:shade val="50000"/>
+              </a:schemeClr>
+            </a:lnRef>
+            <a:fillRef idx="1">
+              <a:schemeClr val="accent1"/>
+            </a:fillRef>
+            <a:effectRef idx="0">
+              <a:schemeClr val="accent1"/>
+            </a:effectRef>
+            <a:fontRef idx="minor">
+              <a:schemeClr val="lt1"/>
+            </a:fontRef>
+          </p:style>
+          <p:txBody>
+            <a:bodyPr rtlCol="0" anchor="ctr"/>
+            <a:lstStyle/>
+            <a:p>
+              <a:pPr algn="ctr"/>
+              <a:endParaRPr lang="en-US" dirty="0">
+                <a:solidFill>
+                  <a:schemeClr val="tx1"/>
+                </a:solidFill>
+              </a:endParaRPr>
+            </a:p>
+          </p:txBody>
+        </p:sp>
+        <p:sp>
+          <p:nvSpPr>
+            <p:cNvPr id="109" name="Flowchart: Card 108">
+              <a:extLst>
+                <a:ext uri="{FF2B5EF4-FFF2-40B4-BE49-F238E27FC236}">
+                  <a16:creationId xmlns:a16="http://schemas.microsoft.com/office/drawing/2014/main" id="{8414BC32-207B-4E72-ABB7-4785C0835DF8}"/>
+                </a:ext>
+              </a:extLst>
+            </p:cNvPr>
+            <p:cNvSpPr/>
+            <p:nvPr/>
+          </p:nvSpPr>
+          <p:spPr>
+            <a:xfrm>
+              <a:off x="1371600" y="1371600"/>
+              <a:ext cx="1371600" cy="804671"/>
+            </a:xfrm>
+            <a:prstGeom prst="flowChartPunchedCard">
+              <a:avLst/>
+            </a:prstGeom>
+            <a:solidFill>
+              <a:schemeClr val="bg1"/>
+            </a:solidFill>
+            <a:ln>
+              <a:solidFill>
+                <a:schemeClr val="tx1"/>
+              </a:solidFill>
+            </a:ln>
+          </p:spPr>
+          <p:style>
+            <a:lnRef idx="2">
+              <a:schemeClr val="accent1">
+                <a:shade val="50000"/>
+              </a:schemeClr>
+            </a:lnRef>
+            <a:fillRef idx="1">
+              <a:schemeClr val="accent1"/>
+            </a:fillRef>
+            <a:effectRef idx="0">
+              <a:schemeClr val="accent1"/>
+            </a:effectRef>
+            <a:fontRef idx="minor">
+              <a:schemeClr val="lt1"/>
+            </a:fontRef>
+          </p:style>
+          <p:txBody>
+            <a:bodyPr rtlCol="0" anchor="ctr"/>
+            <a:lstStyle/>
+            <a:p>
+              <a:pPr algn="ctr"/>
+              <a:r>
+                <a:rPr lang="en-US" dirty="0">
+                  <a:solidFill>
+                    <a:schemeClr val="tx1"/>
+                  </a:solidFill>
+                </a:rPr>
+                <a:t>Endpoint</a:t>
+              </a:r>
+            </a:p>
+          </p:txBody>
+        </p:sp>
+      </p:grpSp>
+      <p:cxnSp>
+        <p:nvCxnSpPr>
+          <p:cNvPr id="98" name="Connector: Elbow 97">
+            <a:extLst>
+              <a:ext uri="{FF2B5EF4-FFF2-40B4-BE49-F238E27FC236}">
+                <a16:creationId xmlns:a16="http://schemas.microsoft.com/office/drawing/2014/main" id="{43DC7E2B-AF7E-480E-8175-A56D3AD91C3A}"/>
+              </a:ext>
+            </a:extLst>
+          </p:cNvPr>
+          <p:cNvCxnSpPr>
+            <a:cxnSpLocks/>
+            <a:stCxn id="91" idx="3"/>
+            <a:endCxn id="9" idx="0"/>
+          </p:cNvCxnSpPr>
+          <p:nvPr/>
+        </p:nvCxnSpPr>
+        <p:spPr>
+          <a:xfrm>
+            <a:off x="4038600" y="1111490"/>
+            <a:ext cx="1448589" cy="1043103"/>
+          </a:xfrm>
+          <a:prstGeom prst="bentConnector2">
+            <a:avLst/>
+          </a:prstGeom>
+          <a:ln>
+            <a:solidFill>
+              <a:schemeClr val="tx1"/>
+            </a:solidFill>
+            <a:tailEnd type="arrow"/>
+          </a:ln>
+        </p:spPr>
+        <p:style>
+          <a:lnRef idx="1">
+            <a:schemeClr val="accent1"/>
+          </a:lnRef>
+          <a:fillRef idx="0">
+            <a:schemeClr val="accent1"/>
+          </a:fillRef>
+          <a:effectRef idx="0">
+            <a:schemeClr val="accent1"/>
+          </a:effectRef>
+          <a:fontRef idx="minor">
+            <a:schemeClr val="tx1"/>
+          </a:fontRef>
+        </p:style>
+      </p:cxnSp>
+      <p:sp>
+        <p:nvSpPr>
+          <p:cNvPr id="110" name="TextBox 109">
+            <a:extLst>
+              <a:ext uri="{FF2B5EF4-FFF2-40B4-BE49-F238E27FC236}">
+                <a16:creationId xmlns:a16="http://schemas.microsoft.com/office/drawing/2014/main" id="{1E4CFDAB-A574-433C-95FA-1D8755D91EB1}"/>
+              </a:ext>
+            </a:extLst>
+          </p:cNvPr>
+          <p:cNvSpPr txBox="1"/>
+          <p:nvPr/>
+        </p:nvSpPr>
+        <p:spPr>
+          <a:xfrm>
+            <a:off x="4585826" y="922998"/>
+            <a:ext cx="833883" cy="246221"/>
+          </a:xfrm>
+          <a:prstGeom prst="rect">
+            <a:avLst/>
+          </a:prstGeom>
+          <a:noFill/>
+        </p:spPr>
+        <p:txBody>
+          <a:bodyPr wrap="none" rtlCol="0">
+            <a:spAutoFit/>
+          </a:bodyPr>
+          <a:lstStyle/>
+          <a:p>
+            <a:r>
+              <a:rPr lang="en-US" sz="1000" dirty="0"/>
+              <a:t>organization</a:t>
+            </a:r>
+          </a:p>
+        </p:txBody>
+      </p:sp>
+      <p:sp>
+        <p:nvSpPr>
+          <p:cNvPr id="111" name="TextBox 110">
+            <a:extLst>
+              <a:ext uri="{FF2B5EF4-FFF2-40B4-BE49-F238E27FC236}">
+                <a16:creationId xmlns:a16="http://schemas.microsoft.com/office/drawing/2014/main" id="{D4791850-5F5C-401F-AD08-6B16BB010D96}"/>
+              </a:ext>
+            </a:extLst>
+          </p:cNvPr>
+          <p:cNvSpPr txBox="1"/>
+          <p:nvPr/>
+        </p:nvSpPr>
+        <p:spPr>
+          <a:xfrm>
+            <a:off x="5419709" y="1838506"/>
+            <a:ext cx="524773" cy="246221"/>
+          </a:xfrm>
+          <a:prstGeom prst="rect">
+            <a:avLst/>
+          </a:prstGeom>
+          <a:noFill/>
+        </p:spPr>
+        <p:txBody>
+          <a:bodyPr wrap="square" rtlCol="0">
+            <a:spAutoFit/>
+          </a:bodyPr>
+          <a:lstStyle/>
+          <a:p>
+            <a:r>
+              <a:rPr lang="en-US" sz="1000" dirty="0"/>
+              <a:t>[0..*]</a:t>
+            </a:r>
+          </a:p>
+        </p:txBody>
+      </p:sp>
+      <p:sp>
+        <p:nvSpPr>
+          <p:cNvPr id="112" name="TextBox 111">
+            <a:extLst>
+              <a:ext uri="{FF2B5EF4-FFF2-40B4-BE49-F238E27FC236}">
+                <a16:creationId xmlns:a16="http://schemas.microsoft.com/office/drawing/2014/main" id="{F561E00D-718B-45A5-A526-87D346224570}"/>
+              </a:ext>
+            </a:extLst>
+          </p:cNvPr>
+          <p:cNvSpPr txBox="1"/>
+          <p:nvPr/>
+        </p:nvSpPr>
+        <p:spPr>
+          <a:xfrm>
+            <a:off x="3984853" y="884983"/>
+            <a:ext cx="524773" cy="246221"/>
+          </a:xfrm>
+          <a:prstGeom prst="rect">
+            <a:avLst/>
+          </a:prstGeom>
+          <a:noFill/>
+        </p:spPr>
+        <p:txBody>
+          <a:bodyPr wrap="square" rtlCol="0">
+            <a:spAutoFit/>
+          </a:bodyPr>
+          <a:lstStyle/>
+          <a:p>
+            <a:r>
+              <a:rPr lang="en-US" sz="1000" dirty="0"/>
+              <a:t>[1..*]</a:t>
+            </a:r>
+          </a:p>
+        </p:txBody>
+      </p:sp>
+      <p:cxnSp>
+        <p:nvCxnSpPr>
+          <p:cNvPr id="113" name="Connector: Elbow 112">
+            <a:extLst>
+              <a:ext uri="{FF2B5EF4-FFF2-40B4-BE49-F238E27FC236}">
+                <a16:creationId xmlns:a16="http://schemas.microsoft.com/office/drawing/2014/main" id="{3BB2E861-6824-4F9D-A3AE-B7ACD81FDF43}"/>
+              </a:ext>
+            </a:extLst>
+          </p:cNvPr>
+          <p:cNvCxnSpPr>
+            <a:cxnSpLocks/>
+            <a:stCxn id="91" idx="2"/>
+            <a:endCxn id="9" idx="0"/>
+          </p:cNvCxnSpPr>
+          <p:nvPr/>
+        </p:nvCxnSpPr>
+        <p:spPr>
+          <a:xfrm rot="16200000" flipH="1">
+            <a:off x="4019638" y="687041"/>
+            <a:ext cx="800713" cy="2134389"/>
+          </a:xfrm>
+          <a:prstGeom prst="bentConnector3">
+            <a:avLst>
+              <a:gd name="adj1" fmla="val 32622"/>
+            </a:avLst>
+          </a:prstGeom>
+          <a:ln>
+            <a:solidFill>
+              <a:schemeClr val="tx1"/>
+            </a:solidFill>
+            <a:tailEnd type="arrow"/>
+          </a:ln>
+        </p:spPr>
+        <p:style>
+          <a:lnRef idx="1">
+            <a:schemeClr val="accent1"/>
+          </a:lnRef>
+          <a:fillRef idx="0">
+            <a:schemeClr val="accent1"/>
+          </a:fillRef>
+          <a:effectRef idx="0">
+            <a:schemeClr val="accent1"/>
+          </a:effectRef>
+          <a:fontRef idx="minor">
+            <a:schemeClr val="tx1"/>
+          </a:fontRef>
+        </p:style>
+      </p:cxnSp>
+      <p:sp>
+        <p:nvSpPr>
+          <p:cNvPr id="114" name="TextBox 113">
+            <a:extLst>
+              <a:ext uri="{FF2B5EF4-FFF2-40B4-BE49-F238E27FC236}">
+                <a16:creationId xmlns:a16="http://schemas.microsoft.com/office/drawing/2014/main" id="{0D6F818D-3BCA-41BA-9AC5-34D551805474}"/>
+              </a:ext>
+            </a:extLst>
+          </p:cNvPr>
+          <p:cNvSpPr txBox="1"/>
+          <p:nvPr/>
+        </p:nvSpPr>
+        <p:spPr>
+          <a:xfrm>
+            <a:off x="3640777" y="1402346"/>
+            <a:ext cx="1519968" cy="246221"/>
+          </a:xfrm>
+          <a:prstGeom prst="rect">
+            <a:avLst/>
+          </a:prstGeom>
+          <a:noFill/>
+        </p:spPr>
+        <p:txBody>
+          <a:bodyPr wrap="none" rtlCol="0">
+            <a:spAutoFit/>
+          </a:bodyPr>
+          <a:lstStyle/>
+          <a:p>
+            <a:r>
+              <a:rPr lang="en-US" sz="1000" dirty="0"/>
+              <a:t>participating organization</a:t>
+            </a:r>
+          </a:p>
+        </p:txBody>
+      </p:sp>
+      <p:sp>
+        <p:nvSpPr>
+          <p:cNvPr id="115" name="TextBox 114">
+            <a:extLst>
+              <a:ext uri="{FF2B5EF4-FFF2-40B4-BE49-F238E27FC236}">
+                <a16:creationId xmlns:a16="http://schemas.microsoft.com/office/drawing/2014/main" id="{174A3B12-0625-424F-BAFC-3BB7084049CC}"/>
+              </a:ext>
+            </a:extLst>
+          </p:cNvPr>
+          <p:cNvSpPr txBox="1"/>
+          <p:nvPr/>
+        </p:nvSpPr>
+        <p:spPr>
+          <a:xfrm>
+            <a:off x="2982322" y="1324774"/>
+            <a:ext cx="524773" cy="246221"/>
+          </a:xfrm>
+          <a:prstGeom prst="rect">
+            <a:avLst/>
+          </a:prstGeom>
+          <a:noFill/>
+        </p:spPr>
+        <p:txBody>
+          <a:bodyPr wrap="square" rtlCol="0">
+            <a:spAutoFit/>
+          </a:bodyPr>
+          <a:lstStyle/>
+          <a:p>
+            <a:r>
+              <a:rPr lang="en-US" sz="1000" dirty="0"/>
+              <a:t>[1..*]</a:t>
+            </a:r>
+          </a:p>
+        </p:txBody>
+      </p:sp>
+      <p:cxnSp>
+        <p:nvCxnSpPr>
+          <p:cNvPr id="116" name="Connector: Elbow 115">
+            <a:extLst>
+              <a:ext uri="{FF2B5EF4-FFF2-40B4-BE49-F238E27FC236}">
+                <a16:creationId xmlns:a16="http://schemas.microsoft.com/office/drawing/2014/main" id="{C44912E8-8FC4-4799-AD02-B4A9F8BEDCE2}"/>
+              </a:ext>
+            </a:extLst>
+          </p:cNvPr>
+          <p:cNvCxnSpPr>
+            <a:cxnSpLocks/>
+            <a:stCxn id="91" idx="0"/>
+            <a:endCxn id="109" idx="0"/>
+          </p:cNvCxnSpPr>
+          <p:nvPr/>
+        </p:nvCxnSpPr>
+        <p:spPr>
+          <a:xfrm rot="5400000" flipH="1" flipV="1">
+            <a:off x="5447838" y="-1225939"/>
+            <a:ext cx="1" cy="4190076"/>
+          </a:xfrm>
+          <a:prstGeom prst="bentConnector3">
+            <a:avLst>
+              <a:gd name="adj1" fmla="val 22860100000"/>
+            </a:avLst>
+          </a:prstGeom>
+          <a:ln>
+            <a:solidFill>
+              <a:schemeClr val="tx1"/>
+            </a:solidFill>
+            <a:tailEnd type="arrow"/>
+          </a:ln>
+        </p:spPr>
+        <p:style>
+          <a:lnRef idx="1">
+            <a:schemeClr val="accent1"/>
+          </a:lnRef>
+          <a:fillRef idx="0">
+            <a:schemeClr val="accent1"/>
+          </a:fillRef>
+          <a:effectRef idx="0">
+            <a:schemeClr val="accent1"/>
+          </a:effectRef>
+          <a:fontRef idx="minor">
+            <a:schemeClr val="tx1"/>
+          </a:fontRef>
+        </p:style>
+      </p:cxnSp>
+      <p:sp>
+        <p:nvSpPr>
+          <p:cNvPr id="117" name="TextBox 116">
+            <a:extLst>
+              <a:ext uri="{FF2B5EF4-FFF2-40B4-BE49-F238E27FC236}">
+                <a16:creationId xmlns:a16="http://schemas.microsoft.com/office/drawing/2014/main" id="{B0D0A124-A27B-403B-9C71-D46BE63E3680}"/>
+              </a:ext>
+            </a:extLst>
+          </p:cNvPr>
+          <p:cNvSpPr txBox="1"/>
+          <p:nvPr/>
+        </p:nvSpPr>
+        <p:spPr>
+          <a:xfrm>
+            <a:off x="4883247" y="428871"/>
+            <a:ext cx="657552" cy="246221"/>
+          </a:xfrm>
+          <a:prstGeom prst="rect">
+            <a:avLst/>
+          </a:prstGeom>
+          <a:noFill/>
+        </p:spPr>
+        <p:txBody>
+          <a:bodyPr wrap="none" rtlCol="0">
+            <a:spAutoFit/>
+          </a:bodyPr>
+          <a:lstStyle/>
+          <a:p>
+            <a:r>
+              <a:rPr lang="en-US" sz="1000" dirty="0"/>
+              <a:t>endpoint</a:t>
+            </a:r>
+          </a:p>
+        </p:txBody>
+      </p:sp>
+      <p:sp>
+        <p:nvSpPr>
+          <p:cNvPr id="118" name="TextBox 117">
+            <a:extLst>
+              <a:ext uri="{FF2B5EF4-FFF2-40B4-BE49-F238E27FC236}">
+                <a16:creationId xmlns:a16="http://schemas.microsoft.com/office/drawing/2014/main" id="{7052DD15-A10C-42C3-A06E-4AEC290215B4}"/>
+              </a:ext>
+            </a:extLst>
+          </p:cNvPr>
+          <p:cNvSpPr txBox="1"/>
+          <p:nvPr/>
+        </p:nvSpPr>
+        <p:spPr>
+          <a:xfrm>
+            <a:off x="2949236" y="576968"/>
+            <a:ext cx="524773" cy="246221"/>
+          </a:xfrm>
+          <a:prstGeom prst="rect">
+            <a:avLst/>
+          </a:prstGeom>
+          <a:noFill/>
+        </p:spPr>
+        <p:txBody>
+          <a:bodyPr wrap="square" rtlCol="0">
+            <a:spAutoFit/>
+          </a:bodyPr>
+          <a:lstStyle/>
+          <a:p>
+            <a:r>
+              <a:rPr lang="en-US" sz="1000" dirty="0"/>
+              <a:t>[0..*]</a:t>
+            </a:r>
+          </a:p>
+        </p:txBody>
+      </p:sp>
+      <p:sp>
+        <p:nvSpPr>
+          <p:cNvPr id="119" name="TextBox 118">
+            <a:extLst>
+              <a:ext uri="{FF2B5EF4-FFF2-40B4-BE49-F238E27FC236}">
+                <a16:creationId xmlns:a16="http://schemas.microsoft.com/office/drawing/2014/main" id="{79B8489B-C383-4067-8AA1-FC00B6444174}"/>
+              </a:ext>
+            </a:extLst>
+          </p:cNvPr>
+          <p:cNvSpPr txBox="1"/>
+          <p:nvPr/>
+        </p:nvSpPr>
+        <p:spPr>
+          <a:xfrm>
+            <a:off x="7496802" y="556225"/>
+            <a:ext cx="524773" cy="246221"/>
+          </a:xfrm>
+          <a:prstGeom prst="rect">
+            <a:avLst/>
+          </a:prstGeom>
+          <a:noFill/>
+        </p:spPr>
+        <p:txBody>
+          <a:bodyPr wrap="square" rtlCol="0">
+            <a:spAutoFit/>
+          </a:bodyPr>
+          <a:lstStyle/>
+          <a:p>
+            <a:r>
+              <a:rPr lang="en-US" sz="1000" dirty="0"/>
+              <a:t>[0..*]</a:t>
+            </a:r>
+          </a:p>
+        </p:txBody>
+      </p:sp>
+      <p:cxnSp>
+        <p:nvCxnSpPr>
+          <p:cNvPr id="120" name="Connector: Elbow 119">
+            <a:extLst>
+              <a:ext uri="{FF2B5EF4-FFF2-40B4-BE49-F238E27FC236}">
+                <a16:creationId xmlns:a16="http://schemas.microsoft.com/office/drawing/2014/main" id="{CC6231EB-90D3-46B4-A466-656CC6A3C81E}"/>
+              </a:ext>
+            </a:extLst>
+          </p:cNvPr>
+          <p:cNvCxnSpPr>
+            <a:cxnSpLocks/>
+            <a:endCxn id="109" idx="2"/>
+          </p:cNvCxnSpPr>
+          <p:nvPr/>
+        </p:nvCxnSpPr>
+        <p:spPr>
+          <a:xfrm flipV="1">
+            <a:off x="6163196" y="1353879"/>
+            <a:ext cx="1379680" cy="870877"/>
+          </a:xfrm>
+          <a:prstGeom prst="bentConnector2">
+            <a:avLst/>
+          </a:prstGeom>
+          <a:ln>
+            <a:solidFill>
+              <a:schemeClr val="tx1"/>
+            </a:solidFill>
+            <a:tailEnd type="arrow"/>
+          </a:ln>
+        </p:spPr>
+        <p:style>
+          <a:lnRef idx="1">
+            <a:schemeClr val="accent1"/>
+          </a:lnRef>
+          <a:fillRef idx="0">
+            <a:schemeClr val="accent1"/>
+          </a:fillRef>
+          <a:effectRef idx="0">
+            <a:schemeClr val="accent1"/>
+          </a:effectRef>
+          <a:fontRef idx="minor">
+            <a:schemeClr val="tx1"/>
+          </a:fontRef>
+        </p:style>
+      </p:cxnSp>
+      <p:sp>
+        <p:nvSpPr>
+          <p:cNvPr id="122" name="TextBox 121">
+            <a:extLst>
+              <a:ext uri="{FF2B5EF4-FFF2-40B4-BE49-F238E27FC236}">
+                <a16:creationId xmlns:a16="http://schemas.microsoft.com/office/drawing/2014/main" id="{AE8124BF-C664-4318-A113-D19D848B3662}"/>
+              </a:ext>
+            </a:extLst>
+          </p:cNvPr>
+          <p:cNvSpPr txBox="1"/>
+          <p:nvPr/>
+        </p:nvSpPr>
+        <p:spPr>
+          <a:xfrm>
+            <a:off x="7297399" y="1586542"/>
+            <a:ext cx="338554" cy="565219"/>
+          </a:xfrm>
+          <a:prstGeom prst="rect">
+            <a:avLst/>
+          </a:prstGeom>
+          <a:noFill/>
+        </p:spPr>
+        <p:txBody>
+          <a:bodyPr vert="vert270" wrap="none" rtlCol="0">
+            <a:spAutoFit/>
+          </a:bodyPr>
+          <a:lstStyle/>
+          <a:p>
+            <a:r>
+              <a:rPr lang="en-US" sz="1000" dirty="0"/>
+              <a:t>endpoint</a:t>
+            </a:r>
+          </a:p>
+        </p:txBody>
+      </p:sp>
+      <p:sp>
+        <p:nvSpPr>
+          <p:cNvPr id="123" name="TextBox 122">
+            <a:extLst>
+              <a:ext uri="{FF2B5EF4-FFF2-40B4-BE49-F238E27FC236}">
+                <a16:creationId xmlns:a16="http://schemas.microsoft.com/office/drawing/2014/main" id="{5A70E0CC-AC39-4658-9FFB-D92A027E68E0}"/>
+              </a:ext>
+            </a:extLst>
+          </p:cNvPr>
+          <p:cNvSpPr txBox="1"/>
+          <p:nvPr/>
+        </p:nvSpPr>
+        <p:spPr>
+          <a:xfrm>
+            <a:off x="7508996" y="1391773"/>
+            <a:ext cx="524773" cy="246221"/>
+          </a:xfrm>
+          <a:prstGeom prst="rect">
+            <a:avLst/>
+          </a:prstGeom>
+          <a:noFill/>
+        </p:spPr>
+        <p:txBody>
+          <a:bodyPr wrap="square" rtlCol="0">
+            <a:spAutoFit/>
+          </a:bodyPr>
+          <a:lstStyle/>
+          <a:p>
+            <a:r>
+              <a:rPr lang="en-US" sz="1000" dirty="0"/>
+              <a:t>[0..*]</a:t>
+            </a:r>
+          </a:p>
+        </p:txBody>
+      </p:sp>
+      <p:sp>
+        <p:nvSpPr>
+          <p:cNvPr id="124" name="TextBox 123">
+            <a:extLst>
+              <a:ext uri="{FF2B5EF4-FFF2-40B4-BE49-F238E27FC236}">
+                <a16:creationId xmlns:a16="http://schemas.microsoft.com/office/drawing/2014/main" id="{87385A15-1A35-48A6-93DE-7B7FE082F913}"/>
+              </a:ext>
+            </a:extLst>
+          </p:cNvPr>
+          <p:cNvSpPr txBox="1"/>
+          <p:nvPr/>
+        </p:nvSpPr>
+        <p:spPr>
+          <a:xfrm>
+            <a:off x="6144907" y="2027265"/>
+            <a:ext cx="524773" cy="246221"/>
+          </a:xfrm>
+          <a:prstGeom prst="rect">
+            <a:avLst/>
+          </a:prstGeom>
+          <a:noFill/>
+        </p:spPr>
+        <p:txBody>
+          <a:bodyPr wrap="square" rtlCol="0">
+            <a:spAutoFit/>
+          </a:bodyPr>
+          <a:lstStyle/>
+          <a:p>
+            <a:r>
+              <a:rPr lang="en-US" sz="1000" dirty="0"/>
+              <a:t>[0..*]</a:t>
+            </a:r>
+          </a:p>
+        </p:txBody>
+      </p:sp>
+    </p:spTree>
+    <p:extLst>
+      <p:ext uri="{BB962C8B-B14F-4D97-AF65-F5344CB8AC3E}">
+        <p14:creationId xmlns:p14="http://schemas.microsoft.com/office/powerpoint/2010/main" val="153491282"/>
+      </p:ext>
+    </p:extLst>
+  </p:cSld>
+  <p:clrMapOvr>
+    <a:masterClrMapping/>
+  </p:clrMapOvr>
+</p:sld>
+</file>
+
+<file path=ppt/slides/slide4.xml><?xml version="1.0" encoding="utf-8"?>
+<p:sld xmlns:a="http://schemas.openxmlformats.org/drawingml/2006/main" xmlns:r="http://schemas.openxmlformats.org/officeDocument/2006/relationships" xmlns:p="http://schemas.openxmlformats.org/presentationml/2006/main">
+  <p:cSld>
+    <p:spTree>
+      <p:nvGrpSpPr>
+        <p:cNvPr id="1" name=""/>
+        <p:cNvGrpSpPr/>
+        <p:nvPr/>
+      </p:nvGrpSpPr>
+      <p:grpSpPr>
+        <a:xfrm>
+          <a:off x="0" y="0"/>
+          <a:ext cx="0" cy="0"/>
+          <a:chOff x="0" y="0"/>
+          <a:chExt cx="0" cy="0"/>
+        </a:xfrm>
+      </p:grpSpPr>
       <p:sp>
         <p:nvSpPr>
           <p:cNvPr id="2" name="Rectangle 1">

</xml_diff>